<commit_message>
week09 presentation file update
</commit_message>
<xml_diff>
--- a/presentation/Week09.학습 관련 기술들.pptx
+++ b/presentation/Week09.학습 관련 기술들.pptx
@@ -10,31 +10,36 @@
     <p:sldId id="258" r:id="rId4"/>
     <p:sldId id="273" r:id="rId5"/>
     <p:sldId id="274" r:id="rId6"/>
-    <p:sldId id="259" r:id="rId7"/>
-    <p:sldId id="260" r:id="rId8"/>
-    <p:sldId id="261" r:id="rId9"/>
-    <p:sldId id="262" r:id="rId10"/>
-    <p:sldId id="263" r:id="rId11"/>
-    <p:sldId id="264" r:id="rId12"/>
-    <p:sldId id="265" r:id="rId13"/>
-    <p:sldId id="266" r:id="rId14"/>
-    <p:sldId id="267" r:id="rId15"/>
-    <p:sldId id="268" r:id="rId16"/>
-    <p:sldId id="269" r:id="rId17"/>
-    <p:sldId id="270" r:id="rId18"/>
-    <p:sldId id="271" r:id="rId19"/>
-    <p:sldId id="272" r:id="rId20"/>
-    <p:sldId id="275" r:id="rId21"/>
-    <p:sldId id="276" r:id="rId22"/>
-    <p:sldId id="277" r:id="rId23"/>
-    <p:sldId id="278" r:id="rId24"/>
-    <p:sldId id="279" r:id="rId25"/>
-    <p:sldId id="280" r:id="rId26"/>
-    <p:sldId id="281" r:id="rId27"/>
-    <p:sldId id="282" r:id="rId28"/>
-    <p:sldId id="283" r:id="rId29"/>
-    <p:sldId id="284" r:id="rId30"/>
-    <p:sldId id="285" r:id="rId31"/>
+    <p:sldId id="286" r:id="rId7"/>
+    <p:sldId id="287" r:id="rId8"/>
+    <p:sldId id="259" r:id="rId9"/>
+    <p:sldId id="261" r:id="rId10"/>
+    <p:sldId id="262" r:id="rId11"/>
+    <p:sldId id="263" r:id="rId12"/>
+    <p:sldId id="264" r:id="rId13"/>
+    <p:sldId id="288" r:id="rId14"/>
+    <p:sldId id="265" r:id="rId15"/>
+    <p:sldId id="266" r:id="rId16"/>
+    <p:sldId id="267" r:id="rId17"/>
+    <p:sldId id="289" r:id="rId18"/>
+    <p:sldId id="268" r:id="rId19"/>
+    <p:sldId id="269" r:id="rId20"/>
+    <p:sldId id="270" r:id="rId21"/>
+    <p:sldId id="271" r:id="rId22"/>
+    <p:sldId id="272" r:id="rId23"/>
+    <p:sldId id="290" r:id="rId24"/>
+    <p:sldId id="275" r:id="rId25"/>
+    <p:sldId id="276" r:id="rId26"/>
+    <p:sldId id="291" r:id="rId27"/>
+    <p:sldId id="277" r:id="rId28"/>
+    <p:sldId id="278" r:id="rId29"/>
+    <p:sldId id="279" r:id="rId30"/>
+    <p:sldId id="280" r:id="rId31"/>
+    <p:sldId id="281" r:id="rId32"/>
+    <p:sldId id="282" r:id="rId33"/>
+    <p:sldId id="283" r:id="rId34"/>
+    <p:sldId id="284" r:id="rId35"/>
+    <p:sldId id="285" r:id="rId36"/>
   </p:sldIdLst>
   <p:sldSz cx="12192000" cy="6858000"/>
   <p:notesSz cx="6858000" cy="9144000"/>
@@ -272,7 +277,7 @@
           <a:p>
             <a:fld id="{7B2CD941-6A28-4354-96C5-881B3BE98A0B}" type="datetimeFigureOut">
               <a:rPr lang="ko-KR" altLang="en-US" smtClean="0"/>
-              <a:t>2019-02-21</a:t>
+              <a:t>2019-02-22</a:t>
             </a:fld>
             <a:endParaRPr lang="ko-KR" altLang="en-US"/>
           </a:p>
@@ -442,7 +447,7 @@
           <a:p>
             <a:fld id="{7B2CD941-6A28-4354-96C5-881B3BE98A0B}" type="datetimeFigureOut">
               <a:rPr lang="ko-KR" altLang="en-US" smtClean="0"/>
-              <a:t>2019-02-21</a:t>
+              <a:t>2019-02-22</a:t>
             </a:fld>
             <a:endParaRPr lang="ko-KR" altLang="en-US"/>
           </a:p>
@@ -622,7 +627,7 @@
           <a:p>
             <a:fld id="{7B2CD941-6A28-4354-96C5-881B3BE98A0B}" type="datetimeFigureOut">
               <a:rPr lang="ko-KR" altLang="en-US" smtClean="0"/>
-              <a:t>2019-02-21</a:t>
+              <a:t>2019-02-22</a:t>
             </a:fld>
             <a:endParaRPr lang="ko-KR" altLang="en-US"/>
           </a:p>
@@ -792,7 +797,7 @@
           <a:p>
             <a:fld id="{7B2CD941-6A28-4354-96C5-881B3BE98A0B}" type="datetimeFigureOut">
               <a:rPr lang="ko-KR" altLang="en-US" smtClean="0"/>
-              <a:t>2019-02-21</a:t>
+              <a:t>2019-02-22</a:t>
             </a:fld>
             <a:endParaRPr lang="ko-KR" altLang="en-US"/>
           </a:p>
@@ -1038,7 +1043,7 @@
           <a:p>
             <a:fld id="{7B2CD941-6A28-4354-96C5-881B3BE98A0B}" type="datetimeFigureOut">
               <a:rPr lang="ko-KR" altLang="en-US" smtClean="0"/>
-              <a:t>2019-02-21</a:t>
+              <a:t>2019-02-22</a:t>
             </a:fld>
             <a:endParaRPr lang="ko-KR" altLang="en-US"/>
           </a:p>
@@ -1270,7 +1275,7 @@
           <a:p>
             <a:fld id="{7B2CD941-6A28-4354-96C5-881B3BE98A0B}" type="datetimeFigureOut">
               <a:rPr lang="ko-KR" altLang="en-US" smtClean="0"/>
-              <a:t>2019-02-21</a:t>
+              <a:t>2019-02-22</a:t>
             </a:fld>
             <a:endParaRPr lang="ko-KR" altLang="en-US"/>
           </a:p>
@@ -1637,7 +1642,7 @@
           <a:p>
             <a:fld id="{7B2CD941-6A28-4354-96C5-881B3BE98A0B}" type="datetimeFigureOut">
               <a:rPr lang="ko-KR" altLang="en-US" smtClean="0"/>
-              <a:t>2019-02-21</a:t>
+              <a:t>2019-02-22</a:t>
             </a:fld>
             <a:endParaRPr lang="ko-KR" altLang="en-US"/>
           </a:p>
@@ -1755,7 +1760,7 @@
           <a:p>
             <a:fld id="{7B2CD941-6A28-4354-96C5-881B3BE98A0B}" type="datetimeFigureOut">
               <a:rPr lang="ko-KR" altLang="en-US" smtClean="0"/>
-              <a:t>2019-02-21</a:t>
+              <a:t>2019-02-22</a:t>
             </a:fld>
             <a:endParaRPr lang="ko-KR" altLang="en-US"/>
           </a:p>
@@ -1850,7 +1855,7 @@
           <a:p>
             <a:fld id="{7B2CD941-6A28-4354-96C5-881B3BE98A0B}" type="datetimeFigureOut">
               <a:rPr lang="ko-KR" altLang="en-US" smtClean="0"/>
-              <a:t>2019-02-21</a:t>
+              <a:t>2019-02-22</a:t>
             </a:fld>
             <a:endParaRPr lang="ko-KR" altLang="en-US"/>
           </a:p>
@@ -2127,7 +2132,7 @@
           <a:p>
             <a:fld id="{7B2CD941-6A28-4354-96C5-881B3BE98A0B}" type="datetimeFigureOut">
               <a:rPr lang="ko-KR" altLang="en-US" smtClean="0"/>
-              <a:t>2019-02-21</a:t>
+              <a:t>2019-02-22</a:t>
             </a:fld>
             <a:endParaRPr lang="ko-KR" altLang="en-US"/>
           </a:p>
@@ -2380,7 +2385,7 @@
           <a:p>
             <a:fld id="{7B2CD941-6A28-4354-96C5-881B3BE98A0B}" type="datetimeFigureOut">
               <a:rPr lang="ko-KR" altLang="en-US" smtClean="0"/>
-              <a:t>2019-02-21</a:t>
+              <a:t>2019-02-22</a:t>
             </a:fld>
             <a:endParaRPr lang="ko-KR" altLang="en-US"/>
           </a:p>
@@ -2593,7 +2598,7 @@
           <a:p>
             <a:fld id="{7B2CD941-6A28-4354-96C5-881B3BE98A0B}" type="datetimeFigureOut">
               <a:rPr lang="ko-KR" altLang="en-US" smtClean="0"/>
-              <a:t>2019-02-21</a:t>
+              <a:t>2019-02-22</a:t>
             </a:fld>
             <a:endParaRPr lang="ko-KR" altLang="en-US"/>
           </a:p>
@@ -3125,7 +3130,7 @@
         <p:spPr>
           <a:xfrm>
             <a:off x="838200" y="1825625"/>
-            <a:ext cx="10515600" cy="511175"/>
+            <a:ext cx="10515600" cy="483466"/>
           </a:xfrm>
         </p:spPr>
         <p:txBody>
@@ -3140,12 +3145,13 @@
               <a:rPr lang="ko-KR" altLang="en-US" dirty="0" smtClean="0"/>
               <a:t>의 단점</a:t>
             </a:r>
+            <a:endParaRPr lang="ko-KR" altLang="en-US" dirty="0"/>
           </a:p>
         </p:txBody>
       </p:sp>
       <p:pic>
         <p:nvPicPr>
-          <p:cNvPr id="5" name="Picture 4"/>
+          <p:cNvPr id="4" name="Picture 3"/>
           <p:cNvPicPr>
             <a:picLocks noChangeAspect="1"/>
           </p:cNvPicPr>
@@ -3165,8 +3171,8 @@
         </p:blipFill>
         <p:spPr>
           <a:xfrm>
-            <a:off x="101596" y="2243573"/>
-            <a:ext cx="6133751" cy="4556500"/>
+            <a:off x="4843287" y="1969447"/>
+            <a:ext cx="2505425" cy="924054"/>
           </a:xfrm>
           <a:prstGeom prst="rect">
             <a:avLst/>
@@ -3175,7 +3181,7 @@
       </p:pic>
       <p:pic>
         <p:nvPicPr>
-          <p:cNvPr id="6" name="Picture 5"/>
+          <p:cNvPr id="5" name="Picture 4"/>
           <p:cNvPicPr>
             <a:picLocks noChangeAspect="1"/>
           </p:cNvPicPr>
@@ -3195,8 +3201,8 @@
         </p:blipFill>
         <p:spPr>
           <a:xfrm>
-            <a:off x="6235347" y="2280517"/>
-            <a:ext cx="5726632" cy="4388136"/>
+            <a:off x="1801419" y="2743200"/>
+            <a:ext cx="8777172" cy="3939819"/>
           </a:xfrm>
           <a:prstGeom prst="rect">
             <a:avLst/>
@@ -3206,13 +3212,20 @@
     </p:spTree>
     <p:extLst>
       <p:ext uri="{BB962C8B-B14F-4D97-AF65-F5344CB8AC3E}">
-        <p14:creationId xmlns:p14="http://schemas.microsoft.com/office/powerpoint/2010/main" val="3742421500"/>
+        <p14:creationId xmlns:p14="http://schemas.microsoft.com/office/powerpoint/2010/main" val="1469368300"/>
       </p:ext>
     </p:extLst>
   </p:cSld>
   <p:clrMapOvr>
     <a:masterClrMapping/>
   </p:clrMapOvr>
+  <p:timing>
+    <p:tnLst>
+      <p:par>
+        <p:cTn id="1" dur="indefinite" restart="never" nodeType="tmRoot"/>
+      </p:par>
+    </p:tnLst>
+  </p:timing>
 </p:sld>
 </file>
 
@@ -3273,34 +3286,27 @@
         <p:spPr>
           <a:xfrm>
             <a:off x="838200" y="1825625"/>
-            <a:ext cx="10515600" cy="464993"/>
-          </a:xfrm>
-        </p:spPr>
-        <p:txBody>
-          <a:bodyPr>
-            <a:normAutofit lnSpcReduction="10000"/>
-          </a:bodyPr>
-          <a:lstStyle/>
-          <a:p>
-            <a:r>
-              <a:rPr lang="en-US" altLang="ko-KR" dirty="0" smtClean="0"/>
-              <a:t>6.1.4 </a:t>
-            </a:r>
-            <a:r>
-              <a:rPr lang="ko-KR" altLang="en-US" dirty="0" smtClean="0"/>
-              <a:t>모멘텀</a:t>
-            </a:r>
-            <a:r>
-              <a:rPr lang="en-US" altLang="ko-KR" dirty="0" smtClean="0"/>
-              <a:t>(Momentum)</a:t>
-            </a:r>
-            <a:endParaRPr lang="ko-KR" altLang="en-US" dirty="0"/>
+            <a:ext cx="10515600" cy="511175"/>
+          </a:xfrm>
+        </p:spPr>
+        <p:txBody>
+          <a:bodyPr/>
+          <a:lstStyle/>
+          <a:p>
+            <a:r>
+              <a:rPr lang="en-US" altLang="ko-KR" dirty="0" smtClean="0"/>
+              <a:t>6.1.3 SGD</a:t>
+            </a:r>
+            <a:r>
+              <a:rPr lang="ko-KR" altLang="en-US" dirty="0" smtClean="0"/>
+              <a:t>의 단점</a:t>
+            </a:r>
           </a:p>
         </p:txBody>
       </p:sp>
       <p:pic>
         <p:nvPicPr>
-          <p:cNvPr id="4" name="Picture 3"/>
+          <p:cNvPr id="5" name="Picture 4"/>
           <p:cNvPicPr>
             <a:picLocks noChangeAspect="1"/>
           </p:cNvPicPr>
@@ -3320,8 +3326,8 @@
         </p:blipFill>
         <p:spPr>
           <a:xfrm>
-            <a:off x="5019525" y="2216347"/>
-            <a:ext cx="2152950" cy="1390844"/>
+            <a:off x="101596" y="2243573"/>
+            <a:ext cx="6133751" cy="4556500"/>
           </a:xfrm>
           <a:prstGeom prst="rect">
             <a:avLst/>
@@ -3330,7 +3336,7 @@
       </p:pic>
       <p:pic>
         <p:nvPicPr>
-          <p:cNvPr id="5" name="Picture 4"/>
+          <p:cNvPr id="6" name="Picture 5"/>
           <p:cNvPicPr>
             <a:picLocks noChangeAspect="1"/>
           </p:cNvPicPr>
@@ -3350,54 +3356,219 @@
         </p:blipFill>
         <p:spPr>
           <a:xfrm>
-            <a:off x="5658358" y="80738"/>
-            <a:ext cx="6413570" cy="1431828"/>
+            <a:off x="6235347" y="2280517"/>
+            <a:ext cx="5726632" cy="4388136"/>
           </a:xfrm>
           <a:prstGeom prst="rect">
             <a:avLst/>
           </a:prstGeom>
         </p:spPr>
       </p:pic>
-      <p:pic>
-        <p:nvPicPr>
-          <p:cNvPr id="6" name="Picture 5"/>
-          <p:cNvPicPr>
-            <a:picLocks noChangeAspect="1"/>
-          </p:cNvPicPr>
-          <p:nvPr/>
-        </p:nvPicPr>
-        <p:blipFill>
-          <a:blip r:embed="rId4">
-            <a:extLst>
-              <a:ext uri="{28A0092B-C50C-407E-A947-70E740481C1C}">
-                <a14:useLocalDpi xmlns:a14="http://schemas.microsoft.com/office/drawing/2010/main" val="0"/>
-              </a:ext>
-            </a:extLst>
-          </a:blip>
-          <a:stretch>
-            <a:fillRect/>
-          </a:stretch>
-        </p:blipFill>
-        <p:spPr>
-          <a:xfrm>
-            <a:off x="2671284" y="3134920"/>
-            <a:ext cx="6849431" cy="3543795"/>
+      <p:sp>
+        <p:nvSpPr>
+          <p:cNvPr id="4" name="TextBox 3"/>
+          <p:cNvSpPr txBox="1"/>
+          <p:nvPr/>
+        </p:nvSpPr>
+        <p:spPr>
+          <a:xfrm>
+            <a:off x="7750754" y="1292549"/>
+            <a:ext cx="4339650" cy="646331"/>
           </a:xfrm>
           <a:prstGeom prst="rect">
             <a:avLst/>
           </a:prstGeom>
-        </p:spPr>
-      </p:pic>
+          <a:noFill/>
+        </p:spPr>
+        <p:txBody>
+          <a:bodyPr wrap="none" rtlCol="0">
+            <a:spAutoFit/>
+          </a:bodyPr>
+          <a:lstStyle/>
+          <a:p>
+            <a:r>
+              <a:rPr lang="zh-CN" altLang="en-US" dirty="0" smtClean="0">
+                <a:solidFill>
+                  <a:srgbClr val="FF0000"/>
+                </a:solidFill>
+              </a:rPr>
+              <a:t>如果函数的形状非均向，比如呈延伸状，</a:t>
+            </a:r>
+            <a:endParaRPr lang="en-US" altLang="zh-CN" dirty="0" smtClean="0">
+              <a:solidFill>
+                <a:srgbClr val="FF0000"/>
+              </a:solidFill>
+            </a:endParaRPr>
+          </a:p>
+          <a:p>
+            <a:r>
+              <a:rPr lang="zh-CN" altLang="en-US" dirty="0">
+                <a:solidFill>
+                  <a:srgbClr val="FF0000"/>
+                </a:solidFill>
+              </a:rPr>
+              <a:t>搜</a:t>
+            </a:r>
+            <a:r>
+              <a:rPr lang="zh-CN" altLang="en-US" dirty="0" smtClean="0">
+                <a:solidFill>
+                  <a:srgbClr val="FF0000"/>
+                </a:solidFill>
+              </a:rPr>
+              <a:t>索的路径会非常低效</a:t>
+            </a:r>
+            <a:endParaRPr lang="ko-KR" altLang="en-US" dirty="0">
+              <a:solidFill>
+                <a:srgbClr val="FF0000"/>
+              </a:solidFill>
+            </a:endParaRPr>
+          </a:p>
+        </p:txBody>
+      </p:sp>
     </p:spTree>
     <p:extLst>
       <p:ext uri="{BB962C8B-B14F-4D97-AF65-F5344CB8AC3E}">
-        <p14:creationId xmlns:p14="http://schemas.microsoft.com/office/powerpoint/2010/main" val="4188047253"/>
+        <p14:creationId xmlns:p14="http://schemas.microsoft.com/office/powerpoint/2010/main" val="3742421500"/>
       </p:ext>
     </p:extLst>
   </p:cSld>
   <p:clrMapOvr>
     <a:masterClrMapping/>
   </p:clrMapOvr>
+  <p:timing>
+    <p:tnLst>
+      <p:par>
+        <p:cTn id="1" dur="indefinite" restart="never" nodeType="tmRoot">
+          <p:childTnLst>
+            <p:seq concurrent="1" nextAc="seek">
+              <p:cTn id="2" dur="indefinite" nodeType="mainSeq">
+                <p:childTnLst>
+                  <p:par>
+                    <p:cTn id="3" fill="hold">
+                      <p:stCondLst>
+                        <p:cond delay="indefinite"/>
+                      </p:stCondLst>
+                      <p:childTnLst>
+                        <p:par>
+                          <p:cTn id="4" fill="hold">
+                            <p:stCondLst>
+                              <p:cond delay="0"/>
+                            </p:stCondLst>
+                            <p:childTnLst>
+                              <p:par>
+                                <p:cTn id="5" presetID="10" presetClass="entr" presetSubtype="0" fill="hold" nodeType="clickEffect">
+                                  <p:stCondLst>
+                                    <p:cond delay="0"/>
+                                  </p:stCondLst>
+                                  <p:childTnLst>
+                                    <p:set>
+                                      <p:cBhvr>
+                                        <p:cTn id="6" dur="1" fill="hold">
+                                          <p:stCondLst>
+                                            <p:cond delay="0"/>
+                                          </p:stCondLst>
+                                        </p:cTn>
+                                        <p:tgtEl>
+                                          <p:spTgt spid="4">
+                                            <p:txEl>
+                                              <p:pRg st="0" end="0"/>
+                                            </p:txEl>
+                                          </p:spTgt>
+                                        </p:tgtEl>
+                                        <p:attrNameLst>
+                                          <p:attrName>style.visibility</p:attrName>
+                                        </p:attrNameLst>
+                                      </p:cBhvr>
+                                      <p:to>
+                                        <p:strVal val="visible"/>
+                                      </p:to>
+                                    </p:set>
+                                    <p:animEffect transition="in" filter="fade">
+                                      <p:cBhvr>
+                                        <p:cTn id="7" dur="500"/>
+                                        <p:tgtEl>
+                                          <p:spTgt spid="4">
+                                            <p:txEl>
+                                              <p:pRg st="0" end="0"/>
+                                            </p:txEl>
+                                          </p:spTgt>
+                                        </p:tgtEl>
+                                      </p:cBhvr>
+                                    </p:animEffect>
+                                  </p:childTnLst>
+                                </p:cTn>
+                              </p:par>
+                              <p:par>
+                                <p:cTn id="8" presetID="10" presetClass="entr" presetSubtype="0" fill="hold" nodeType="withEffect">
+                                  <p:stCondLst>
+                                    <p:cond delay="0"/>
+                                  </p:stCondLst>
+                                  <p:childTnLst>
+                                    <p:set>
+                                      <p:cBhvr>
+                                        <p:cTn id="9" dur="1" fill="hold">
+                                          <p:stCondLst>
+                                            <p:cond delay="0"/>
+                                          </p:stCondLst>
+                                        </p:cTn>
+                                        <p:tgtEl>
+                                          <p:spTgt spid="4">
+                                            <p:txEl>
+                                              <p:pRg st="1" end="1"/>
+                                            </p:txEl>
+                                          </p:spTgt>
+                                        </p:tgtEl>
+                                        <p:attrNameLst>
+                                          <p:attrName>style.visibility</p:attrName>
+                                        </p:attrNameLst>
+                                      </p:cBhvr>
+                                      <p:to>
+                                        <p:strVal val="visible"/>
+                                      </p:to>
+                                    </p:set>
+                                    <p:animEffect transition="in" filter="fade">
+                                      <p:cBhvr>
+                                        <p:cTn id="10" dur="500"/>
+                                        <p:tgtEl>
+                                          <p:spTgt spid="4">
+                                            <p:txEl>
+                                              <p:pRg st="1" end="1"/>
+                                            </p:txEl>
+                                          </p:spTgt>
+                                        </p:tgtEl>
+                                      </p:cBhvr>
+                                    </p:animEffect>
+                                  </p:childTnLst>
+                                </p:cTn>
+                              </p:par>
+                            </p:childTnLst>
+                          </p:cTn>
+                        </p:par>
+                      </p:childTnLst>
+                    </p:cTn>
+                  </p:par>
+                </p:childTnLst>
+              </p:cTn>
+              <p:prevCondLst>
+                <p:cond evt="onPrev" delay="0">
+                  <p:tgtEl>
+                    <p:sldTgt/>
+                  </p:tgtEl>
+                </p:cond>
+              </p:prevCondLst>
+              <p:nextCondLst>
+                <p:cond evt="onNext" delay="0">
+                  <p:tgtEl>
+                    <p:sldTgt/>
+                  </p:tgtEl>
+                </p:cond>
+              </p:nextCondLst>
+            </p:seq>
+          </p:childTnLst>
+        </p:cTn>
+      </p:par>
+    </p:tnLst>
+  </p:timing>
 </p:sld>
 </file>
 
@@ -3458,7 +3629,7 @@
         <p:spPr>
           <a:xfrm>
             <a:off x="838200" y="1825625"/>
-            <a:ext cx="10515600" cy="474230"/>
+            <a:ext cx="10515600" cy="464993"/>
           </a:xfrm>
         </p:spPr>
         <p:txBody>
@@ -3477,9 +3648,17 @@
             </a:r>
             <a:r>
               <a:rPr lang="en-US" altLang="ko-KR" dirty="0" smtClean="0"/>
-              <a:t>(Momentum)</a:t>
-            </a:r>
-            <a:endParaRPr lang="ko-KR" altLang="en-US" dirty="0" smtClean="0"/>
+              <a:t>(Momentum</a:t>
+            </a:r>
+            <a:r>
+              <a:rPr lang="en-US" altLang="ko-KR" dirty="0" smtClean="0"/>
+              <a:t>) </a:t>
+            </a:r>
+            <a:r>
+              <a:rPr lang="zh-CN" altLang="en-US" dirty="0" smtClean="0"/>
+              <a:t>动量</a:t>
+            </a:r>
+            <a:endParaRPr lang="ko-KR" altLang="en-US" dirty="0"/>
           </a:p>
         </p:txBody>
       </p:sp>
@@ -3505,8 +3684,68 @@
         </p:blipFill>
         <p:spPr>
           <a:xfrm>
-            <a:off x="2826332" y="2220253"/>
-            <a:ext cx="6298550" cy="4558161"/>
+            <a:off x="1305365" y="3610371"/>
+            <a:ext cx="2152950" cy="1390844"/>
+          </a:xfrm>
+          <a:prstGeom prst="rect">
+            <a:avLst/>
+          </a:prstGeom>
+        </p:spPr>
+      </p:pic>
+      <p:pic>
+        <p:nvPicPr>
+          <p:cNvPr id="5" name="Picture 4"/>
+          <p:cNvPicPr>
+            <a:picLocks noChangeAspect="1"/>
+          </p:cNvPicPr>
+          <p:nvPr/>
+        </p:nvPicPr>
+        <p:blipFill>
+          <a:blip r:embed="rId3">
+            <a:extLst>
+              <a:ext uri="{28A0092B-C50C-407E-A947-70E740481C1C}">
+                <a14:useLocalDpi xmlns:a14="http://schemas.microsoft.com/office/drawing/2010/main" val="0"/>
+              </a:ext>
+            </a:extLst>
+          </a:blip>
+          <a:stretch>
+            <a:fillRect/>
+          </a:stretch>
+        </p:blipFill>
+        <p:spPr>
+          <a:xfrm>
+            <a:off x="5658358" y="80738"/>
+            <a:ext cx="6413570" cy="1431828"/>
+          </a:xfrm>
+          <a:prstGeom prst="rect">
+            <a:avLst/>
+          </a:prstGeom>
+        </p:spPr>
+      </p:pic>
+      <p:pic>
+        <p:nvPicPr>
+          <p:cNvPr id="6" name="Picture 5"/>
+          <p:cNvPicPr>
+            <a:picLocks noChangeAspect="1"/>
+          </p:cNvPicPr>
+          <p:nvPr/>
+        </p:nvPicPr>
+        <p:blipFill>
+          <a:blip r:embed="rId4">
+            <a:extLst>
+              <a:ext uri="{28A0092B-C50C-407E-A947-70E740481C1C}">
+                <a14:useLocalDpi xmlns:a14="http://schemas.microsoft.com/office/drawing/2010/main" val="0"/>
+              </a:ext>
+            </a:extLst>
+          </a:blip>
+          <a:stretch>
+            <a:fillRect/>
+          </a:stretch>
+        </p:blipFill>
+        <p:spPr>
+          <a:xfrm>
+            <a:off x="3817856" y="2425555"/>
+            <a:ext cx="7774436" cy="4022379"/>
           </a:xfrm>
           <a:prstGeom prst="rect">
             <a:avLst/>
@@ -3516,13 +3755,20 @@
     </p:spTree>
     <p:extLst>
       <p:ext uri="{BB962C8B-B14F-4D97-AF65-F5344CB8AC3E}">
-        <p14:creationId xmlns:p14="http://schemas.microsoft.com/office/powerpoint/2010/main" val="294802504"/>
+        <p14:creationId xmlns:p14="http://schemas.microsoft.com/office/powerpoint/2010/main" val="4188047253"/>
       </p:ext>
     </p:extLst>
   </p:cSld>
   <p:clrMapOvr>
     <a:masterClrMapping/>
   </p:clrMapOvr>
+  <p:timing>
+    <p:tnLst>
+      <p:par>
+        <p:cTn id="1" dur="indefinite" restart="never" nodeType="tmRoot"/>
+      </p:par>
+    </p:tnLst>
+  </p:timing>
 </p:sld>
 </file>
 
@@ -3559,109 +3805,169 @@
           <a:lstStyle/>
           <a:p>
             <a:r>
-              <a:rPr lang="en-US" altLang="ko-KR" dirty="0" smtClean="0"/>
+              <a:rPr lang="en-US" altLang="ko-KR" dirty="0"/>
               <a:t>6.1 </a:t>
             </a:r>
             <a:r>
-              <a:rPr lang="ko-KR" altLang="en-US" dirty="0" smtClean="0"/>
+              <a:rPr lang="ko-KR" altLang="en-US" dirty="0"/>
               <a:t>매개변수 갱신</a:t>
             </a:r>
-            <a:endParaRPr lang="ko-KR" altLang="en-US" dirty="0"/>
-          </a:p>
-        </p:txBody>
-      </p:sp>
-      <p:sp>
-        <p:nvSpPr>
-          <p:cNvPr id="3" name="Content Placeholder 2"/>
-          <p:cNvSpPr>
-            <a:spLocks noGrp="1"/>
-          </p:cNvSpPr>
-          <p:nvPr>
-            <p:ph idx="1"/>
-          </p:nvPr>
-        </p:nvSpPr>
-        <p:spPr/>
-        <p:txBody>
-          <a:bodyPr/>
-          <a:lstStyle/>
-          <a:p>
-            <a:r>
-              <a:rPr lang="en-US" altLang="ko-KR" dirty="0" smtClean="0"/>
-              <a:t>6.1.5 </a:t>
-            </a:r>
-            <a:r>
-              <a:rPr lang="en-US" altLang="ko-KR" dirty="0" err="1" smtClean="0"/>
-              <a:t>AdaGrad</a:t>
-            </a:r>
-            <a:endParaRPr lang="en-US" altLang="ko-KR" dirty="0" smtClean="0"/>
-          </a:p>
-          <a:p>
-            <a:pPr lvl="1"/>
-            <a:r>
-              <a:rPr lang="ko-KR" altLang="en-US" dirty="0" smtClean="0"/>
-              <a:t>신경망 학습에서는 학습률 값이 중요합니다</a:t>
-            </a:r>
-            <a:r>
-              <a:rPr lang="en-US" altLang="ko-KR" dirty="0" smtClean="0"/>
-              <a:t>. </a:t>
-            </a:r>
-            <a:r>
-              <a:rPr lang="ko-KR" altLang="en-US" dirty="0" smtClean="0"/>
-              <a:t>값이 너무 작으면 학습기간이 길고</a:t>
-            </a:r>
-            <a:r>
-              <a:rPr lang="en-US" altLang="ko-KR" dirty="0" smtClean="0"/>
-              <a:t>, </a:t>
-            </a:r>
-            <a:r>
-              <a:rPr lang="ko-KR" altLang="en-US" dirty="0" smtClean="0"/>
-              <a:t>너무 크면 발산하여 학습이 제대로 이루어지지 않습니다</a:t>
-            </a:r>
-            <a:r>
-              <a:rPr lang="en-US" altLang="ko-KR" dirty="0" smtClean="0"/>
-              <a:t>.</a:t>
-            </a:r>
-          </a:p>
-          <a:p>
-            <a:pPr lvl="1"/>
-            <a:r>
-              <a:rPr lang="ko-KR" altLang="en-US" dirty="0" smtClean="0"/>
-              <a:t>이 학습률을 정하는 효과적 기술로 학습률 감소</a:t>
-            </a:r>
-            <a:r>
-              <a:rPr lang="en-US" altLang="ko-KR" dirty="0" smtClean="0"/>
-              <a:t>(learning rate decay)</a:t>
-            </a:r>
-            <a:r>
-              <a:rPr lang="ko-KR" altLang="en-US" dirty="0" smtClean="0"/>
-              <a:t>가 있습니다</a:t>
-            </a:r>
-            <a:r>
-              <a:rPr lang="en-US" altLang="ko-KR" dirty="0" smtClean="0"/>
-              <a:t>. </a:t>
-            </a:r>
-            <a:r>
-              <a:rPr lang="ko-KR" altLang="en-US" dirty="0" smtClean="0"/>
-              <a:t>바로 학습을 진행하면서 학습률을 점차 줄여가는 방법입니다</a:t>
-            </a:r>
-            <a:r>
-              <a:rPr lang="en-US" altLang="ko-KR" dirty="0" smtClean="0"/>
-              <a:t>.</a:t>
-            </a:r>
-            <a:endParaRPr lang="ko-KR" altLang="en-US" dirty="0"/>
+          </a:p>
+        </p:txBody>
+      </p:sp>
+      <p:pic>
+        <p:nvPicPr>
+          <p:cNvPr id="4" name="Picture 3"/>
+          <p:cNvPicPr>
+            <a:picLocks noChangeAspect="1"/>
+          </p:cNvPicPr>
+          <p:nvPr/>
+        </p:nvPicPr>
+        <p:blipFill>
+          <a:blip r:embed="rId2">
+            <a:extLst>
+              <a:ext uri="{28A0092B-C50C-407E-A947-70E740481C1C}">
+                <a14:useLocalDpi xmlns:a14="http://schemas.microsoft.com/office/drawing/2010/main" val="0"/>
+              </a:ext>
+            </a:extLst>
+          </a:blip>
+          <a:stretch>
+            <a:fillRect/>
+          </a:stretch>
+        </p:blipFill>
+        <p:spPr>
+          <a:xfrm>
+            <a:off x="4332869" y="2624778"/>
+            <a:ext cx="3305603" cy="4151838"/>
+          </a:xfrm>
+          <a:prstGeom prst="rect">
+            <a:avLst/>
+          </a:prstGeom>
+        </p:spPr>
+      </p:pic>
+      <p:sp>
+        <p:nvSpPr>
+          <p:cNvPr id="5" name="TextBox 4"/>
+          <p:cNvSpPr txBox="1"/>
+          <p:nvPr/>
+        </p:nvSpPr>
+        <p:spPr>
+          <a:xfrm>
+            <a:off x="744214" y="1369129"/>
+            <a:ext cx="10703571" cy="1477328"/>
+          </a:xfrm>
+          <a:prstGeom prst="rect">
+            <a:avLst/>
+          </a:prstGeom>
+          <a:noFill/>
+        </p:spPr>
+        <p:txBody>
+          <a:bodyPr wrap="none" rtlCol="0">
+            <a:spAutoFit/>
+          </a:bodyPr>
+          <a:lstStyle/>
+          <a:p>
+            <a:r>
+              <a:rPr lang="zh-CN" altLang="en-US" dirty="0"/>
+              <a:t>而由于动量积攒了历史的梯度，如点</a:t>
+            </a:r>
+            <a:r>
+              <a:rPr lang="en-US" altLang="zh-CN" dirty="0"/>
+              <a:t>P</a:t>
+            </a:r>
+            <a:r>
+              <a:rPr lang="zh-CN" altLang="en-US" dirty="0"/>
+              <a:t>前一刻的梯度与当前的梯度方向几乎相反</a:t>
+            </a:r>
+            <a:r>
+              <a:rPr lang="zh-CN" altLang="en-US" dirty="0" smtClean="0"/>
+              <a:t>。</a:t>
+            </a:r>
+            <a:endParaRPr lang="en-US" altLang="zh-CN" dirty="0" smtClean="0"/>
+          </a:p>
+          <a:p>
+            <a:r>
+              <a:rPr lang="zh-CN" altLang="en-US" dirty="0" smtClean="0"/>
+              <a:t>因</a:t>
+            </a:r>
+            <a:r>
+              <a:rPr lang="zh-CN" altLang="en-US" dirty="0"/>
+              <a:t>此原本在</a:t>
+            </a:r>
+            <a:r>
+              <a:rPr lang="en-US" altLang="zh-CN" dirty="0"/>
+              <a:t>P</a:t>
+            </a:r>
+            <a:r>
+              <a:rPr lang="zh-CN" altLang="en-US" dirty="0"/>
+              <a:t>点原本要大幅徘徊的梯度，主要受到前一时刻的影响，而导致在当前时刻的梯度幅度减</a:t>
+            </a:r>
+            <a:r>
+              <a:rPr lang="zh-CN" altLang="en-US" dirty="0" smtClean="0"/>
+              <a:t>小。</a:t>
+            </a:r>
+            <a:endParaRPr lang="en-US" altLang="zh-CN" dirty="0" smtClean="0"/>
+          </a:p>
+          <a:p>
+            <a:r>
+              <a:rPr lang="zh-CN" altLang="en-US" dirty="0" smtClean="0"/>
+              <a:t> </a:t>
+            </a:r>
+            <a:r>
+              <a:rPr lang="zh-CN" altLang="en-US" dirty="0"/>
+              <a:t>  </a:t>
+            </a:r>
+            <a:endParaRPr lang="en-US" altLang="zh-CN" dirty="0" smtClean="0"/>
+          </a:p>
+          <a:p>
+            <a:r>
+              <a:rPr lang="zh-CN" altLang="en-US" dirty="0" smtClean="0"/>
+              <a:t>直</a:t>
+            </a:r>
+            <a:r>
+              <a:rPr lang="zh-CN" altLang="en-US" dirty="0"/>
+              <a:t>观上讲就是，要是当前时刻的梯度与历史时刻梯度方向相似，这种趋势在当前时刻则会加强</a:t>
+            </a:r>
+            <a:r>
+              <a:rPr lang="zh-CN" altLang="en-US" dirty="0" smtClean="0"/>
+              <a:t>；</a:t>
+            </a:r>
+            <a:endParaRPr lang="en-US" altLang="zh-CN" dirty="0" smtClean="0"/>
+          </a:p>
+          <a:p>
+            <a:r>
+              <a:rPr lang="zh-CN" altLang="en-US" dirty="0" smtClean="0"/>
+              <a:t>要</a:t>
+            </a:r>
+            <a:r>
+              <a:rPr lang="zh-CN" altLang="en-US" dirty="0"/>
+              <a:t>是不同，则当前时刻的梯度方向减弱</a:t>
+            </a:r>
+            <a:r>
+              <a:rPr lang="zh-CN" altLang="en-US" dirty="0" smtClean="0"/>
+              <a:t>。</a:t>
+            </a:r>
+            <a:endParaRPr lang="zh-CN" altLang="en-US" dirty="0"/>
           </a:p>
         </p:txBody>
       </p:sp>
     </p:spTree>
     <p:extLst>
       <p:ext uri="{BB962C8B-B14F-4D97-AF65-F5344CB8AC3E}">
-        <p14:creationId xmlns:p14="http://schemas.microsoft.com/office/powerpoint/2010/main" val="1014094386"/>
+        <p14:creationId xmlns:p14="http://schemas.microsoft.com/office/powerpoint/2010/main" val="3557689973"/>
       </p:ext>
     </p:extLst>
   </p:cSld>
   <p:clrMapOvr>
     <a:masterClrMapping/>
   </p:clrMapOvr>
+  <p:timing>
+    <p:tnLst>
+      <p:par>
+        <p:cTn id="1" dur="indefinite" restart="never" nodeType="tmRoot"/>
+      </p:par>
+    </p:tnLst>
+  </p:timing>
 </p:sld>
 </file>
 
@@ -3722,22 +4028,28 @@
         <p:spPr>
           <a:xfrm>
             <a:off x="838200" y="1825625"/>
-            <a:ext cx="10515600" cy="501939"/>
-          </a:xfrm>
-        </p:spPr>
-        <p:txBody>
-          <a:bodyPr/>
-          <a:lstStyle/>
-          <a:p>
-            <a:r>
-              <a:rPr lang="en-US" altLang="ko-KR" dirty="0" smtClean="0"/>
-              <a:t>6.1.5 </a:t>
-            </a:r>
-            <a:r>
-              <a:rPr lang="en-US" altLang="ko-KR" dirty="0" err="1" smtClean="0"/>
-              <a:t>AdaGrad</a:t>
-            </a:r>
-            <a:endParaRPr lang="ko-KR" altLang="en-US" dirty="0"/>
+            <a:ext cx="10515600" cy="474230"/>
+          </a:xfrm>
+        </p:spPr>
+        <p:txBody>
+          <a:bodyPr>
+            <a:normAutofit lnSpcReduction="10000"/>
+          </a:bodyPr>
+          <a:lstStyle/>
+          <a:p>
+            <a:r>
+              <a:rPr lang="en-US" altLang="ko-KR" dirty="0" smtClean="0"/>
+              <a:t>6.1.4 </a:t>
+            </a:r>
+            <a:r>
+              <a:rPr lang="ko-KR" altLang="en-US" dirty="0" smtClean="0"/>
+              <a:t>모멘텀</a:t>
+            </a:r>
+            <a:r>
+              <a:rPr lang="en-US" altLang="ko-KR" dirty="0" smtClean="0"/>
+              <a:t>(Momentum)</a:t>
+            </a:r>
+            <a:endParaRPr lang="ko-KR" altLang="en-US" dirty="0" smtClean="0"/>
           </a:p>
         </p:txBody>
       </p:sp>
@@ -3763,38 +4075,8 @@
         </p:blipFill>
         <p:spPr>
           <a:xfrm>
-            <a:off x="4786129" y="2191489"/>
-            <a:ext cx="2619741" cy="1810003"/>
-          </a:xfrm>
-          <a:prstGeom prst="rect">
-            <a:avLst/>
-          </a:prstGeom>
-        </p:spPr>
-      </p:pic>
-      <p:pic>
-        <p:nvPicPr>
-          <p:cNvPr id="5" name="Picture 4"/>
-          <p:cNvPicPr>
-            <a:picLocks noChangeAspect="1"/>
-          </p:cNvPicPr>
-          <p:nvPr/>
-        </p:nvPicPr>
-        <p:blipFill>
-          <a:blip r:embed="rId3">
-            <a:extLst>
-              <a:ext uri="{28A0092B-C50C-407E-A947-70E740481C1C}">
-                <a14:useLocalDpi xmlns:a14="http://schemas.microsoft.com/office/drawing/2010/main" val="0"/>
-              </a:ext>
-            </a:extLst>
-          </a:blip>
-          <a:stretch>
-            <a:fillRect/>
-          </a:stretch>
-        </p:blipFill>
-        <p:spPr>
-          <a:xfrm>
-            <a:off x="2580783" y="3230184"/>
-            <a:ext cx="7030431" cy="3353268"/>
+            <a:off x="2826332" y="2220253"/>
+            <a:ext cx="6298550" cy="4558161"/>
           </a:xfrm>
           <a:prstGeom prst="rect">
             <a:avLst/>
@@ -3804,13 +4086,20 @@
     </p:spTree>
     <p:extLst>
       <p:ext uri="{BB962C8B-B14F-4D97-AF65-F5344CB8AC3E}">
-        <p14:creationId xmlns:p14="http://schemas.microsoft.com/office/powerpoint/2010/main" val="3370878987"/>
+        <p14:creationId xmlns:p14="http://schemas.microsoft.com/office/powerpoint/2010/main" val="294802504"/>
       </p:ext>
     </p:extLst>
   </p:cSld>
   <p:clrMapOvr>
     <a:masterClrMapping/>
   </p:clrMapOvr>
+  <p:timing>
+    <p:tnLst>
+      <p:par>
+        <p:cTn id="1" dur="indefinite" restart="never" nodeType="tmRoot"/>
+      </p:par>
+    </p:tnLst>
+  </p:timing>
 </p:sld>
 </file>
 
@@ -3868,16 +4157,9 @@
             <p:ph idx="1"/>
           </p:nvPr>
         </p:nvSpPr>
-        <p:spPr>
-          <a:xfrm>
-            <a:off x="838200" y="1825625"/>
-            <a:ext cx="10515600" cy="446520"/>
-          </a:xfrm>
-        </p:spPr>
-        <p:txBody>
-          <a:bodyPr>
-            <a:normAutofit lnSpcReduction="10000"/>
-          </a:bodyPr>
+        <p:spPr/>
+        <p:txBody>
+          <a:bodyPr/>
           <a:lstStyle/>
           <a:p>
             <a:r>
@@ -3888,50 +4170,94 @@
               <a:rPr lang="en-US" altLang="ko-KR" dirty="0" err="1" smtClean="0"/>
               <a:t>AdaGrad</a:t>
             </a:r>
+            <a:endParaRPr lang="en-US" altLang="ko-KR" dirty="0" smtClean="0"/>
+          </a:p>
+          <a:p>
+            <a:pPr lvl="1"/>
+            <a:r>
+              <a:rPr lang="ko-KR" altLang="en-US" dirty="0" smtClean="0"/>
+              <a:t>신경망 학습에서는 </a:t>
+            </a:r>
+            <a:r>
+              <a:rPr lang="ko-KR" altLang="en-US" dirty="0" smtClean="0">
+                <a:solidFill>
+                  <a:srgbClr val="FF0000"/>
+                </a:solidFill>
+              </a:rPr>
+              <a:t>학습률</a:t>
+            </a:r>
+            <a:r>
+              <a:rPr lang="ko-KR" altLang="en-US" dirty="0" smtClean="0"/>
+              <a:t> 값이 중요합니다</a:t>
+            </a:r>
+            <a:r>
+              <a:rPr lang="en-US" altLang="ko-KR" dirty="0" smtClean="0"/>
+              <a:t>. </a:t>
+            </a:r>
+            <a:r>
+              <a:rPr lang="ko-KR" altLang="en-US" dirty="0" smtClean="0"/>
+              <a:t>값이 너무 작으면 학습기간이 길고</a:t>
+            </a:r>
+            <a:r>
+              <a:rPr lang="en-US" altLang="ko-KR" dirty="0" smtClean="0"/>
+              <a:t>, </a:t>
+            </a:r>
+            <a:r>
+              <a:rPr lang="ko-KR" altLang="en-US" dirty="0" smtClean="0"/>
+              <a:t>너무 크면 발산하여 학습이 제대로 이루어지지 않습니다</a:t>
+            </a:r>
+            <a:r>
+              <a:rPr lang="en-US" altLang="ko-KR" dirty="0" smtClean="0"/>
+              <a:t>.</a:t>
+            </a:r>
+          </a:p>
+          <a:p>
+            <a:pPr lvl="1"/>
+            <a:r>
+              <a:rPr lang="ko-KR" altLang="en-US" dirty="0" smtClean="0"/>
+              <a:t>이 학습률을 정하는 효과적 기술로 학습률 감소</a:t>
+            </a:r>
+            <a:r>
+              <a:rPr lang="en-US" altLang="ko-KR" dirty="0" smtClean="0"/>
+              <a:t>(learning rate decay)</a:t>
+            </a:r>
+            <a:r>
+              <a:rPr lang="ko-KR" altLang="en-US" dirty="0" smtClean="0"/>
+              <a:t>가 있습니다</a:t>
+            </a:r>
+            <a:r>
+              <a:rPr lang="en-US" altLang="ko-KR" dirty="0" smtClean="0"/>
+              <a:t>. </a:t>
+            </a:r>
+            <a:r>
+              <a:rPr lang="ko-KR" altLang="en-US" dirty="0" smtClean="0"/>
+              <a:t>바로 학습을 진행하면서 학습률을 점차 줄여가는 방법입니다</a:t>
+            </a:r>
+            <a:r>
+              <a:rPr lang="en-US" altLang="ko-KR" dirty="0" smtClean="0"/>
+              <a:t>.</a:t>
+            </a:r>
             <a:endParaRPr lang="ko-KR" altLang="en-US" dirty="0"/>
           </a:p>
         </p:txBody>
       </p:sp>
-      <p:pic>
-        <p:nvPicPr>
-          <p:cNvPr id="4" name="Picture 3"/>
-          <p:cNvPicPr>
-            <a:picLocks noChangeAspect="1"/>
-          </p:cNvPicPr>
-          <p:nvPr/>
-        </p:nvPicPr>
-        <p:blipFill>
-          <a:blip r:embed="rId2">
-            <a:extLst>
-              <a:ext uri="{28A0092B-C50C-407E-A947-70E740481C1C}">
-                <a14:useLocalDpi xmlns:a14="http://schemas.microsoft.com/office/drawing/2010/main" val="0"/>
-              </a:ext>
-            </a:extLst>
-          </a:blip>
-          <a:stretch>
-            <a:fillRect/>
-          </a:stretch>
-        </p:blipFill>
-        <p:spPr>
-          <a:xfrm>
-            <a:off x="3029534" y="2203992"/>
-            <a:ext cx="6003276" cy="4593058"/>
-          </a:xfrm>
-          <a:prstGeom prst="rect">
-            <a:avLst/>
-          </a:prstGeom>
-        </p:spPr>
-      </p:pic>
     </p:spTree>
     <p:extLst>
       <p:ext uri="{BB962C8B-B14F-4D97-AF65-F5344CB8AC3E}">
-        <p14:creationId xmlns:p14="http://schemas.microsoft.com/office/powerpoint/2010/main" val="795438896"/>
+        <p14:creationId xmlns:p14="http://schemas.microsoft.com/office/powerpoint/2010/main" val="1014094386"/>
       </p:ext>
     </p:extLst>
   </p:cSld>
   <p:clrMapOvr>
     <a:masterClrMapping/>
   </p:clrMapOvr>
+  <p:timing>
+    <p:tnLst>
+      <p:par>
+        <p:cTn id="1" dur="indefinite" restart="never" nodeType="tmRoot"/>
+      </p:par>
+    </p:tnLst>
+  </p:timing>
 </p:sld>
 </file>
 
@@ -3989,52 +4315,146 @@
             <p:ph idx="1"/>
           </p:nvPr>
         </p:nvSpPr>
-        <p:spPr/>
+        <p:spPr>
+          <a:xfrm>
+            <a:off x="838200" y="1825625"/>
+            <a:ext cx="10515600" cy="501939"/>
+          </a:xfrm>
+        </p:spPr>
         <p:txBody>
           <a:bodyPr/>
           <a:lstStyle/>
           <a:p>
             <a:r>
               <a:rPr lang="en-US" altLang="ko-KR" dirty="0" smtClean="0"/>
-              <a:t>6.1.6 Adam</a:t>
-            </a:r>
-          </a:p>
-          <a:p>
-            <a:pPr lvl="1"/>
-            <a:r>
-              <a:rPr lang="ko-KR" altLang="en-US" dirty="0" smtClean="0"/>
-              <a:t>모멘텀과 </a:t>
+              <a:t>6.1.5 </a:t>
             </a:r>
             <a:r>
               <a:rPr lang="en-US" altLang="ko-KR" dirty="0" err="1" smtClean="0"/>
               <a:t>AdaGrad</a:t>
             </a:r>
-            <a:r>
-              <a:rPr lang="ko-KR" altLang="en-US" dirty="0" smtClean="0"/>
-              <a:t>를 융합</a:t>
-            </a:r>
-            <a:r>
-              <a:rPr lang="en-US" altLang="ko-KR" dirty="0" smtClean="0"/>
-              <a:t>(</a:t>
-            </a:r>
-            <a:r>
-              <a:rPr lang="ko-KR" altLang="en-US" dirty="0" smtClean="0"/>
-              <a:t>완전히 정확하지 않음</a:t>
-            </a:r>
-            <a:r>
-              <a:rPr lang="en-US" altLang="ko-KR" dirty="0" smtClean="0"/>
-              <a:t>)</a:t>
-            </a:r>
-          </a:p>
-          <a:p>
-            <a:pPr lvl="1"/>
-            <a:r>
-              <a:rPr lang="ko-KR" altLang="en-US" dirty="0" smtClean="0"/>
-              <a:t>논문참조 </a:t>
-            </a:r>
-            <a:r>
-              <a:rPr lang="en-US" altLang="ko-KR" dirty="0" smtClean="0"/>
-              <a:t>: https://arxiv.org/abs/1412.6980v1</a:t>
+            <a:endParaRPr lang="ko-KR" altLang="en-US" dirty="0"/>
+          </a:p>
+        </p:txBody>
+      </p:sp>
+      <p:pic>
+        <p:nvPicPr>
+          <p:cNvPr id="4" name="Picture 3"/>
+          <p:cNvPicPr>
+            <a:picLocks noChangeAspect="1"/>
+          </p:cNvPicPr>
+          <p:nvPr/>
+        </p:nvPicPr>
+        <p:blipFill>
+          <a:blip r:embed="rId2">
+            <a:extLst>
+              <a:ext uri="{28A0092B-C50C-407E-A947-70E740481C1C}">
+                <a14:useLocalDpi xmlns:a14="http://schemas.microsoft.com/office/drawing/2010/main" val="0"/>
+              </a:ext>
+            </a:extLst>
+          </a:blip>
+          <a:stretch>
+            <a:fillRect/>
+          </a:stretch>
+        </p:blipFill>
+        <p:spPr>
+          <a:xfrm>
+            <a:off x="4231947" y="1446302"/>
+            <a:ext cx="2619741" cy="1810003"/>
+          </a:xfrm>
+          <a:prstGeom prst="rect">
+            <a:avLst/>
+          </a:prstGeom>
+        </p:spPr>
+      </p:pic>
+      <p:pic>
+        <p:nvPicPr>
+          <p:cNvPr id="5" name="Picture 4"/>
+          <p:cNvPicPr>
+            <a:picLocks noChangeAspect="1"/>
+          </p:cNvPicPr>
+          <p:nvPr/>
+        </p:nvPicPr>
+        <p:blipFill>
+          <a:blip r:embed="rId3">
+            <a:extLst>
+              <a:ext uri="{28A0092B-C50C-407E-A947-70E740481C1C}">
+                <a14:useLocalDpi xmlns:a14="http://schemas.microsoft.com/office/drawing/2010/main" val="0"/>
+              </a:ext>
+            </a:extLst>
+          </a:blip>
+          <a:stretch>
+            <a:fillRect/>
+          </a:stretch>
+        </p:blipFill>
+        <p:spPr>
+          <a:xfrm>
+            <a:off x="1925003" y="3230184"/>
+            <a:ext cx="7030431" cy="3353268"/>
+          </a:xfrm>
+          <a:prstGeom prst="rect">
+            <a:avLst/>
+          </a:prstGeom>
+        </p:spPr>
+      </p:pic>
+      <p:sp>
+        <p:nvSpPr>
+          <p:cNvPr id="6" name="TextBox 5"/>
+          <p:cNvSpPr txBox="1"/>
+          <p:nvPr/>
+        </p:nvSpPr>
+        <p:spPr>
+          <a:xfrm>
+            <a:off x="6262260" y="3462175"/>
+            <a:ext cx="5931432" cy="1200329"/>
+          </a:xfrm>
+          <a:prstGeom prst="rect">
+            <a:avLst/>
+          </a:prstGeom>
+          <a:noFill/>
+        </p:spPr>
+        <p:txBody>
+          <a:bodyPr wrap="none" rtlCol="0">
+            <a:spAutoFit/>
+          </a:bodyPr>
+          <a:lstStyle/>
+          <a:p>
+            <a:r>
+              <a:rPr lang="en-US" altLang="ko-KR" dirty="0" smtClean="0"/>
+              <a:t>1. h</a:t>
+            </a:r>
+            <a:r>
+              <a:rPr lang="ko-KR" altLang="en-US" dirty="0" smtClean="0"/>
+              <a:t>는 기존 기울기 값을 제곱하여 더해줌</a:t>
+            </a:r>
+            <a:endParaRPr lang="en-US" altLang="ko-KR" dirty="0" smtClean="0"/>
+          </a:p>
+          <a:p>
+            <a:r>
+              <a:rPr lang="en-US" altLang="ko-KR" dirty="0" smtClean="0"/>
+              <a:t>2. </a:t>
+            </a:r>
+            <a:r>
+              <a:rPr lang="ko-KR" altLang="en-US" dirty="0" smtClean="0"/>
+              <a:t>매개변수의 원소 중에서 많이 움직인 원소는 </a:t>
+            </a:r>
+            <a:endParaRPr lang="en-US" altLang="ko-KR" dirty="0" smtClean="0"/>
+          </a:p>
+          <a:p>
+            <a:r>
+              <a:rPr lang="ko-KR" altLang="en-US" dirty="0" smtClean="0"/>
+              <a:t>학습률이 낮아진다</a:t>
+            </a:r>
+            <a:endParaRPr lang="en-US" altLang="ko-KR" dirty="0" smtClean="0"/>
+          </a:p>
+          <a:p>
+            <a:r>
+              <a:rPr lang="en-US" altLang="ko-KR" dirty="0" smtClean="0"/>
+              <a:t>3. </a:t>
+            </a:r>
+            <a:r>
+              <a:rPr lang="ko-KR" altLang="en-US" dirty="0" smtClean="0"/>
+              <a:t>학습률 감소가 매개변수의 원소마다 다르게 적용된다</a:t>
             </a:r>
             <a:endParaRPr lang="ko-KR" altLang="en-US" dirty="0"/>
           </a:p>
@@ -4043,7 +4463,7 @@
     </p:spTree>
     <p:extLst>
       <p:ext uri="{BB962C8B-B14F-4D97-AF65-F5344CB8AC3E}">
-        <p14:creationId xmlns:p14="http://schemas.microsoft.com/office/powerpoint/2010/main" val="1916681209"/>
+        <p14:creationId xmlns:p14="http://schemas.microsoft.com/office/powerpoint/2010/main" val="3370878987"/>
       </p:ext>
     </p:extLst>
   </p:cSld>
@@ -4093,14 +4513,13 @@
           <a:lstStyle/>
           <a:p>
             <a:r>
-              <a:rPr lang="en-US" altLang="ko-KR" dirty="0" smtClean="0"/>
+              <a:rPr lang="en-US" altLang="ko-KR" dirty="0"/>
               <a:t>6.1 </a:t>
             </a:r>
             <a:r>
-              <a:rPr lang="ko-KR" altLang="en-US" dirty="0" smtClean="0"/>
+              <a:rPr lang="ko-KR" altLang="en-US" dirty="0"/>
               <a:t>매개변수 갱신</a:t>
             </a:r>
-            <a:endParaRPr lang="ko-KR" altLang="en-US" dirty="0"/>
           </a:p>
         </p:txBody>
       </p:sp>
@@ -4114,10 +4533,194 @@
             <p:ph idx="1"/>
           </p:nvPr>
         </p:nvSpPr>
+        <p:spPr/>
+        <p:txBody>
+          <a:bodyPr/>
+          <a:lstStyle/>
+          <a:p>
+            <a:r>
+              <a:rPr lang="en-US" altLang="ko-KR" dirty="0"/>
+              <a:t>6.1.5 </a:t>
+            </a:r>
+            <a:r>
+              <a:rPr lang="en-US" altLang="ko-KR" dirty="0" err="1"/>
+              <a:t>AdaGrad</a:t>
+            </a:r>
+            <a:endParaRPr lang="ko-KR" altLang="en-US" dirty="0"/>
+          </a:p>
+          <a:p>
+            <a:pPr lvl="1"/>
+            <a:r>
+              <a:rPr lang="en-US" altLang="ko-KR" dirty="0" err="1" smtClean="0"/>
+              <a:t>AdaGrad</a:t>
+            </a:r>
+            <a:r>
+              <a:rPr lang="ko-KR" altLang="en-US" dirty="0" smtClean="0"/>
+              <a:t>는 과거의 기울기를 제곱하여 계속 더해가며 학습을 진행할수록 갱신 강도가 약해집니다</a:t>
+            </a:r>
+            <a:r>
+              <a:rPr lang="en-US" altLang="ko-KR" dirty="0" smtClean="0"/>
+              <a:t>.</a:t>
+            </a:r>
+          </a:p>
+          <a:p>
+            <a:pPr lvl="1"/>
+            <a:r>
+              <a:rPr lang="ko-KR" altLang="en-US" dirty="0" smtClean="0">
+                <a:solidFill>
+                  <a:srgbClr val="FF0000"/>
+                </a:solidFill>
+              </a:rPr>
+              <a:t>무한히</a:t>
+            </a:r>
+            <a:r>
+              <a:rPr lang="ko-KR" altLang="en-US" dirty="0" smtClean="0"/>
+              <a:t> 계속 학습한다면 어느 순간 갱신량이 </a:t>
+            </a:r>
+            <a:r>
+              <a:rPr lang="en-US" altLang="ko-KR" dirty="0" smtClean="0"/>
+              <a:t>0</a:t>
+            </a:r>
+            <a:r>
+              <a:rPr lang="ko-KR" altLang="en-US" dirty="0" smtClean="0"/>
+              <a:t>이 되어 전혀 갱신되지 않게 됩니다</a:t>
+            </a:r>
+            <a:r>
+              <a:rPr lang="en-US" altLang="ko-KR" dirty="0" smtClean="0"/>
+              <a:t>.</a:t>
+            </a:r>
+          </a:p>
+          <a:p>
+            <a:pPr lvl="1"/>
+            <a:r>
+              <a:rPr lang="ko-KR" altLang="en-US" dirty="0" smtClean="0"/>
+              <a:t>이 문제를 개선한 기법으로서 </a:t>
+            </a:r>
+            <a:r>
+              <a:rPr lang="en-US" altLang="ko-KR" dirty="0" err="1" smtClean="0"/>
+              <a:t>RMSProp</a:t>
+            </a:r>
+            <a:r>
+              <a:rPr lang="ko-KR" altLang="en-US" dirty="0" smtClean="0"/>
+              <a:t>라는 방법이 있습니다</a:t>
+            </a:r>
+            <a:r>
+              <a:rPr lang="en-US" altLang="ko-KR" dirty="0" smtClean="0"/>
+              <a:t>.</a:t>
+            </a:r>
+          </a:p>
+          <a:p>
+            <a:pPr lvl="2"/>
+            <a:r>
+              <a:rPr lang="ko-KR" altLang="en-US" dirty="0" smtClean="0"/>
+              <a:t>과거의 모든 기울기를 균일하게 더해가는 것이 아니라</a:t>
+            </a:r>
+            <a:r>
+              <a:rPr lang="en-US" altLang="ko-KR" dirty="0" smtClean="0"/>
+              <a:t>, </a:t>
+            </a:r>
+            <a:r>
+              <a:rPr lang="ko-KR" altLang="en-US" dirty="0" smtClean="0"/>
+              <a:t>먼 과거의 기울기는 서서히 잊고 새로운 기울기 정보를 크게 반영합니다</a:t>
+            </a:r>
+            <a:r>
+              <a:rPr lang="en-US" altLang="ko-KR" dirty="0" smtClean="0"/>
+              <a:t>. </a:t>
+            </a:r>
+            <a:r>
+              <a:rPr lang="ko-KR" altLang="en-US" dirty="0" smtClean="0"/>
+              <a:t>이를 지수이동평균</a:t>
+            </a:r>
+            <a:r>
+              <a:rPr lang="en-US" altLang="ko-KR" dirty="0" smtClean="0"/>
+              <a:t>(Exponential Moving Average)</a:t>
+            </a:r>
+            <a:r>
+              <a:rPr lang="ko-KR" altLang="en-US" dirty="0" smtClean="0"/>
+              <a:t>이라 하여 과거 기울기의 반영규모를 기하급수적으로 감소</a:t>
+            </a:r>
+            <a:endParaRPr lang="ko-KR" altLang="en-US" dirty="0"/>
+          </a:p>
+        </p:txBody>
+      </p:sp>
+    </p:spTree>
+    <p:extLst>
+      <p:ext uri="{BB962C8B-B14F-4D97-AF65-F5344CB8AC3E}">
+        <p14:creationId xmlns:p14="http://schemas.microsoft.com/office/powerpoint/2010/main" val="2785435849"/>
+      </p:ext>
+    </p:extLst>
+  </p:cSld>
+  <p:clrMapOvr>
+    <a:masterClrMapping/>
+  </p:clrMapOvr>
+  <p:timing>
+    <p:tnLst>
+      <p:par>
+        <p:cTn id="1" dur="indefinite" restart="never" nodeType="tmRoot"/>
+      </p:par>
+    </p:tnLst>
+  </p:timing>
+</p:sld>
+</file>
+
+<file path=ppt/slides/slide18.xml><?xml version="1.0" encoding="utf-8"?>
+<p:sld xmlns:a="http://schemas.openxmlformats.org/drawingml/2006/main" xmlns:r="http://schemas.openxmlformats.org/officeDocument/2006/relationships" xmlns:p="http://schemas.openxmlformats.org/presentationml/2006/main">
+  <p:cSld>
+    <p:spTree>
+      <p:nvGrpSpPr>
+        <p:cNvPr id="1" name=""/>
+        <p:cNvGrpSpPr/>
+        <p:nvPr/>
+      </p:nvGrpSpPr>
+      <p:grpSpPr>
+        <a:xfrm>
+          <a:off x="0" y="0"/>
+          <a:ext cx="0" cy="0"/>
+          <a:chOff x="0" y="0"/>
+          <a:chExt cx="0" cy="0"/>
+        </a:xfrm>
+      </p:grpSpPr>
+      <p:sp>
+        <p:nvSpPr>
+          <p:cNvPr id="2" name="Title 1"/>
+          <p:cNvSpPr>
+            <a:spLocks noGrp="1"/>
+          </p:cNvSpPr>
+          <p:nvPr>
+            <p:ph type="title"/>
+          </p:nvPr>
+        </p:nvSpPr>
+        <p:spPr/>
+        <p:txBody>
+          <a:bodyPr/>
+          <a:lstStyle/>
+          <a:p>
+            <a:r>
+              <a:rPr lang="en-US" altLang="ko-KR" dirty="0" smtClean="0"/>
+              <a:t>6.1 </a:t>
+            </a:r>
+            <a:r>
+              <a:rPr lang="ko-KR" altLang="en-US" dirty="0" smtClean="0"/>
+              <a:t>매개변수 갱신</a:t>
+            </a:r>
+            <a:endParaRPr lang="ko-KR" altLang="en-US" dirty="0"/>
+          </a:p>
+        </p:txBody>
+      </p:sp>
+      <p:sp>
+        <p:nvSpPr>
+          <p:cNvPr id="3" name="Content Placeholder 2"/>
+          <p:cNvSpPr>
+            <a:spLocks noGrp="1"/>
+          </p:cNvSpPr>
+          <p:nvPr>
+            <p:ph idx="1"/>
+          </p:nvPr>
+        </p:nvSpPr>
         <p:spPr>
           <a:xfrm>
             <a:off x="838200" y="1825625"/>
-            <a:ext cx="10515600" cy="455757"/>
+            <a:ext cx="10515600" cy="446520"/>
           </a:xfrm>
         </p:spPr>
         <p:txBody>
@@ -4128,7 +4731,11 @@
           <a:p>
             <a:r>
               <a:rPr lang="en-US" altLang="ko-KR" dirty="0" smtClean="0"/>
-              <a:t>6.1.6 Adam</a:t>
+              <a:t>6.1.5 </a:t>
+            </a:r>
+            <a:r>
+              <a:rPr lang="en-US" altLang="ko-KR" dirty="0" err="1" smtClean="0"/>
+              <a:t>AdaGrad</a:t>
             </a:r>
             <a:endParaRPr lang="ko-KR" altLang="en-US" dirty="0"/>
           </a:p>
@@ -4156,6 +4763,425 @@
         </p:blipFill>
         <p:spPr>
           <a:xfrm>
+            <a:off x="3029534" y="2203992"/>
+            <a:ext cx="6003276" cy="4593058"/>
+          </a:xfrm>
+          <a:prstGeom prst="rect">
+            <a:avLst/>
+          </a:prstGeom>
+        </p:spPr>
+      </p:pic>
+    </p:spTree>
+    <p:extLst>
+      <p:ext uri="{BB962C8B-B14F-4D97-AF65-F5344CB8AC3E}">
+        <p14:creationId xmlns:p14="http://schemas.microsoft.com/office/powerpoint/2010/main" val="795438896"/>
+      </p:ext>
+    </p:extLst>
+  </p:cSld>
+  <p:clrMapOvr>
+    <a:masterClrMapping/>
+  </p:clrMapOvr>
+  <p:timing>
+    <p:tnLst>
+      <p:par>
+        <p:cTn id="1" dur="indefinite" restart="never" nodeType="tmRoot"/>
+      </p:par>
+    </p:tnLst>
+  </p:timing>
+</p:sld>
+</file>
+
+<file path=ppt/slides/slide19.xml><?xml version="1.0" encoding="utf-8"?>
+<p:sld xmlns:a="http://schemas.openxmlformats.org/drawingml/2006/main" xmlns:r="http://schemas.openxmlformats.org/officeDocument/2006/relationships" xmlns:p="http://schemas.openxmlformats.org/presentationml/2006/main">
+  <p:cSld>
+    <p:spTree>
+      <p:nvGrpSpPr>
+        <p:cNvPr id="1" name=""/>
+        <p:cNvGrpSpPr/>
+        <p:nvPr/>
+      </p:nvGrpSpPr>
+      <p:grpSpPr>
+        <a:xfrm>
+          <a:off x="0" y="0"/>
+          <a:ext cx="0" cy="0"/>
+          <a:chOff x="0" y="0"/>
+          <a:chExt cx="0" cy="0"/>
+        </a:xfrm>
+      </p:grpSpPr>
+      <p:sp>
+        <p:nvSpPr>
+          <p:cNvPr id="2" name="Title 1"/>
+          <p:cNvSpPr>
+            <a:spLocks noGrp="1"/>
+          </p:cNvSpPr>
+          <p:nvPr>
+            <p:ph type="title"/>
+          </p:nvPr>
+        </p:nvSpPr>
+        <p:spPr/>
+        <p:txBody>
+          <a:bodyPr/>
+          <a:lstStyle/>
+          <a:p>
+            <a:r>
+              <a:rPr lang="en-US" altLang="ko-KR" dirty="0" smtClean="0"/>
+              <a:t>6.1 </a:t>
+            </a:r>
+            <a:r>
+              <a:rPr lang="ko-KR" altLang="en-US" dirty="0" smtClean="0"/>
+              <a:t>매개변수 갱신</a:t>
+            </a:r>
+            <a:endParaRPr lang="ko-KR" altLang="en-US" dirty="0"/>
+          </a:p>
+        </p:txBody>
+      </p:sp>
+      <p:sp>
+        <p:nvSpPr>
+          <p:cNvPr id="3" name="Content Placeholder 2"/>
+          <p:cNvSpPr>
+            <a:spLocks noGrp="1"/>
+          </p:cNvSpPr>
+          <p:nvPr>
+            <p:ph idx="1"/>
+          </p:nvPr>
+        </p:nvSpPr>
+        <p:spPr/>
+        <p:txBody>
+          <a:bodyPr/>
+          <a:lstStyle/>
+          <a:p>
+            <a:r>
+              <a:rPr lang="en-US" altLang="ko-KR" dirty="0" smtClean="0"/>
+              <a:t>6.1.6 Adam</a:t>
+            </a:r>
+          </a:p>
+          <a:p>
+            <a:pPr lvl="1"/>
+            <a:r>
+              <a:rPr lang="ko-KR" altLang="en-US" dirty="0" smtClean="0"/>
+              <a:t>모멘텀과 </a:t>
+            </a:r>
+            <a:r>
+              <a:rPr lang="en-US" altLang="ko-KR" dirty="0" err="1" smtClean="0"/>
+              <a:t>AdaGrad</a:t>
+            </a:r>
+            <a:r>
+              <a:rPr lang="ko-KR" altLang="en-US" dirty="0" smtClean="0"/>
+              <a:t>를 융합</a:t>
+            </a:r>
+            <a:r>
+              <a:rPr lang="en-US" altLang="ko-KR" dirty="0" smtClean="0"/>
+              <a:t>(</a:t>
+            </a:r>
+            <a:r>
+              <a:rPr lang="ko-KR" altLang="en-US" dirty="0" smtClean="0"/>
+              <a:t>완전히 정확하지 않음</a:t>
+            </a:r>
+            <a:r>
+              <a:rPr lang="en-US" altLang="ko-KR" dirty="0" smtClean="0"/>
+              <a:t>)</a:t>
+            </a:r>
+          </a:p>
+          <a:p>
+            <a:pPr lvl="1"/>
+            <a:r>
+              <a:rPr lang="ko-KR" altLang="en-US" dirty="0" smtClean="0"/>
+              <a:t>논문참조 </a:t>
+            </a:r>
+            <a:r>
+              <a:rPr lang="en-US" altLang="ko-KR" dirty="0" smtClean="0"/>
+              <a:t>: https://arxiv.org/abs/1412.6980v1</a:t>
+            </a:r>
+            <a:endParaRPr lang="ko-KR" altLang="en-US" dirty="0"/>
+          </a:p>
+        </p:txBody>
+      </p:sp>
+    </p:spTree>
+    <p:extLst>
+      <p:ext uri="{BB962C8B-B14F-4D97-AF65-F5344CB8AC3E}">
+        <p14:creationId xmlns:p14="http://schemas.microsoft.com/office/powerpoint/2010/main" val="1916681209"/>
+      </p:ext>
+    </p:extLst>
+  </p:cSld>
+  <p:clrMapOvr>
+    <a:masterClrMapping/>
+  </p:clrMapOvr>
+  <p:timing>
+    <p:tnLst>
+      <p:par>
+        <p:cTn id="1" dur="indefinite" restart="never" nodeType="tmRoot"/>
+      </p:par>
+    </p:tnLst>
+  </p:timing>
+</p:sld>
+</file>
+
+<file path=ppt/slides/slide2.xml><?xml version="1.0" encoding="utf-8"?>
+<p:sld xmlns:a="http://schemas.openxmlformats.org/drawingml/2006/main" xmlns:r="http://schemas.openxmlformats.org/officeDocument/2006/relationships" xmlns:p="http://schemas.openxmlformats.org/presentationml/2006/main">
+  <p:cSld>
+    <p:spTree>
+      <p:nvGrpSpPr>
+        <p:cNvPr id="1" name=""/>
+        <p:cNvGrpSpPr/>
+        <p:nvPr/>
+      </p:nvGrpSpPr>
+      <p:grpSpPr>
+        <a:xfrm>
+          <a:off x="0" y="0"/>
+          <a:ext cx="0" cy="0"/>
+          <a:chOff x="0" y="0"/>
+          <a:chExt cx="0" cy="0"/>
+        </a:xfrm>
+      </p:grpSpPr>
+      <p:sp>
+        <p:nvSpPr>
+          <p:cNvPr id="2" name="Title 1"/>
+          <p:cNvSpPr>
+            <a:spLocks noGrp="1"/>
+          </p:cNvSpPr>
+          <p:nvPr>
+            <p:ph type="title"/>
+          </p:nvPr>
+        </p:nvSpPr>
+        <p:spPr/>
+        <p:txBody>
+          <a:bodyPr/>
+          <a:lstStyle/>
+          <a:p>
+            <a:r>
+              <a:rPr lang="ko-KR" altLang="en-US" dirty="0" smtClean="0"/>
+              <a:t>목차</a:t>
+            </a:r>
+            <a:endParaRPr lang="ko-KR" altLang="en-US" dirty="0"/>
+          </a:p>
+        </p:txBody>
+      </p:sp>
+      <p:sp>
+        <p:nvSpPr>
+          <p:cNvPr id="3" name="Content Placeholder 2"/>
+          <p:cNvSpPr>
+            <a:spLocks noGrp="1"/>
+          </p:cNvSpPr>
+          <p:nvPr>
+            <p:ph idx="1"/>
+          </p:nvPr>
+        </p:nvSpPr>
+        <p:spPr/>
+        <p:txBody>
+          <a:bodyPr/>
+          <a:lstStyle/>
+          <a:p>
+            <a:pPr marL="0" indent="0">
+              <a:buNone/>
+            </a:pPr>
+            <a:r>
+              <a:rPr lang="en-US" altLang="zh-CN" dirty="0" smtClean="0">
+                <a:solidFill>
+                  <a:srgbClr val="FF0000"/>
+                </a:solidFill>
+              </a:rPr>
+              <a:t>6.1 </a:t>
+            </a:r>
+            <a:r>
+              <a:rPr lang="ko-KR" altLang="en-US" dirty="0" smtClean="0">
+                <a:solidFill>
+                  <a:srgbClr val="FF0000"/>
+                </a:solidFill>
+              </a:rPr>
+              <a:t>매개변수 갱신</a:t>
+            </a:r>
+            <a:endParaRPr lang="en-US" altLang="ko-KR" dirty="0" smtClean="0">
+              <a:solidFill>
+                <a:srgbClr val="FF0000"/>
+              </a:solidFill>
+            </a:endParaRPr>
+          </a:p>
+          <a:p>
+            <a:pPr marL="0" indent="0">
+              <a:buNone/>
+            </a:pPr>
+            <a:r>
+              <a:rPr lang="en-US" altLang="ko-KR" dirty="0" smtClean="0">
+                <a:solidFill>
+                  <a:srgbClr val="FF0000"/>
+                </a:solidFill>
+              </a:rPr>
+              <a:t>6.2 </a:t>
+            </a:r>
+            <a:r>
+              <a:rPr lang="ko-KR" altLang="en-US" dirty="0" smtClean="0">
+                <a:solidFill>
+                  <a:srgbClr val="FF0000"/>
+                </a:solidFill>
+              </a:rPr>
+              <a:t>가중치의 초깃값</a:t>
+            </a:r>
+            <a:endParaRPr lang="en-US" altLang="ko-KR" dirty="0" smtClean="0">
+              <a:solidFill>
+                <a:srgbClr val="FF0000"/>
+              </a:solidFill>
+            </a:endParaRPr>
+          </a:p>
+          <a:p>
+            <a:pPr marL="0" indent="0">
+              <a:buNone/>
+            </a:pPr>
+            <a:r>
+              <a:rPr lang="en-US" altLang="ko-KR" dirty="0" smtClean="0"/>
+              <a:t>6.3 </a:t>
+            </a:r>
+            <a:r>
+              <a:rPr lang="ko-KR" altLang="en-US" dirty="0" smtClean="0"/>
+              <a:t>배치 정규화</a:t>
+            </a:r>
+            <a:endParaRPr lang="en-US" altLang="ko-KR" dirty="0" smtClean="0"/>
+          </a:p>
+          <a:p>
+            <a:pPr marL="0" indent="0">
+              <a:buNone/>
+            </a:pPr>
+            <a:r>
+              <a:rPr lang="en-US" altLang="ko-KR" dirty="0" smtClean="0"/>
+              <a:t>6.4 </a:t>
+            </a:r>
+            <a:r>
+              <a:rPr lang="ko-KR" altLang="en-US" dirty="0" smtClean="0"/>
+              <a:t>바른 학습을 위해</a:t>
+            </a:r>
+            <a:endParaRPr lang="en-US" altLang="ko-KR" dirty="0" smtClean="0"/>
+          </a:p>
+          <a:p>
+            <a:pPr marL="0" indent="0">
+              <a:buNone/>
+            </a:pPr>
+            <a:r>
+              <a:rPr lang="en-US" altLang="ko-KR" dirty="0" smtClean="0"/>
+              <a:t>6.5 </a:t>
+            </a:r>
+            <a:r>
+              <a:rPr lang="ko-KR" altLang="en-US" dirty="0" smtClean="0"/>
+              <a:t>적절한 하이퍼파라미터 값 찾기</a:t>
+            </a:r>
+            <a:endParaRPr lang="ko-KR" altLang="en-US" dirty="0"/>
+          </a:p>
+        </p:txBody>
+      </p:sp>
+    </p:spTree>
+    <p:extLst>
+      <p:ext uri="{BB962C8B-B14F-4D97-AF65-F5344CB8AC3E}">
+        <p14:creationId xmlns:p14="http://schemas.microsoft.com/office/powerpoint/2010/main" val="2038353852"/>
+      </p:ext>
+    </p:extLst>
+  </p:cSld>
+  <p:clrMapOvr>
+    <a:masterClrMapping/>
+  </p:clrMapOvr>
+  <p:timing>
+    <p:tnLst>
+      <p:par>
+        <p:cTn id="1" dur="indefinite" restart="never" nodeType="tmRoot"/>
+      </p:par>
+    </p:tnLst>
+  </p:timing>
+</p:sld>
+</file>
+
+<file path=ppt/slides/slide20.xml><?xml version="1.0" encoding="utf-8"?>
+<p:sld xmlns:a="http://schemas.openxmlformats.org/drawingml/2006/main" xmlns:r="http://schemas.openxmlformats.org/officeDocument/2006/relationships" xmlns:p="http://schemas.openxmlformats.org/presentationml/2006/main">
+  <p:cSld>
+    <p:spTree>
+      <p:nvGrpSpPr>
+        <p:cNvPr id="1" name=""/>
+        <p:cNvGrpSpPr/>
+        <p:nvPr/>
+      </p:nvGrpSpPr>
+      <p:grpSpPr>
+        <a:xfrm>
+          <a:off x="0" y="0"/>
+          <a:ext cx="0" cy="0"/>
+          <a:chOff x="0" y="0"/>
+          <a:chExt cx="0" cy="0"/>
+        </a:xfrm>
+      </p:grpSpPr>
+      <p:sp>
+        <p:nvSpPr>
+          <p:cNvPr id="2" name="Title 1"/>
+          <p:cNvSpPr>
+            <a:spLocks noGrp="1"/>
+          </p:cNvSpPr>
+          <p:nvPr>
+            <p:ph type="title"/>
+          </p:nvPr>
+        </p:nvSpPr>
+        <p:spPr/>
+        <p:txBody>
+          <a:bodyPr/>
+          <a:lstStyle/>
+          <a:p>
+            <a:r>
+              <a:rPr lang="en-US" altLang="ko-KR" dirty="0" smtClean="0"/>
+              <a:t>6.1 </a:t>
+            </a:r>
+            <a:r>
+              <a:rPr lang="ko-KR" altLang="en-US" dirty="0" smtClean="0"/>
+              <a:t>매개변수 갱신</a:t>
+            </a:r>
+            <a:endParaRPr lang="ko-KR" altLang="en-US" dirty="0"/>
+          </a:p>
+        </p:txBody>
+      </p:sp>
+      <p:sp>
+        <p:nvSpPr>
+          <p:cNvPr id="3" name="Content Placeholder 2"/>
+          <p:cNvSpPr>
+            <a:spLocks noGrp="1"/>
+          </p:cNvSpPr>
+          <p:nvPr>
+            <p:ph idx="1"/>
+          </p:nvPr>
+        </p:nvSpPr>
+        <p:spPr>
+          <a:xfrm>
+            <a:off x="838200" y="1825625"/>
+            <a:ext cx="10515600" cy="455757"/>
+          </a:xfrm>
+        </p:spPr>
+        <p:txBody>
+          <a:bodyPr>
+            <a:normAutofit lnSpcReduction="10000"/>
+          </a:bodyPr>
+          <a:lstStyle/>
+          <a:p>
+            <a:r>
+              <a:rPr lang="en-US" altLang="ko-KR" dirty="0" smtClean="0"/>
+              <a:t>6.1.6 Adam</a:t>
+            </a:r>
+            <a:endParaRPr lang="ko-KR" altLang="en-US" dirty="0"/>
+          </a:p>
+        </p:txBody>
+      </p:sp>
+      <p:pic>
+        <p:nvPicPr>
+          <p:cNvPr id="4" name="Picture 3"/>
+          <p:cNvPicPr>
+            <a:picLocks noChangeAspect="1"/>
+          </p:cNvPicPr>
+          <p:nvPr/>
+        </p:nvPicPr>
+        <p:blipFill>
+          <a:blip r:embed="rId2">
+            <a:extLst>
+              <a:ext uri="{28A0092B-C50C-407E-A947-70E740481C1C}">
+                <a14:useLocalDpi xmlns:a14="http://schemas.microsoft.com/office/drawing/2010/main" val="0"/>
+              </a:ext>
+            </a:extLst>
+          </a:blip>
+          <a:stretch>
+            <a:fillRect/>
+          </a:stretch>
+        </p:blipFill>
+        <p:spPr>
+          <a:xfrm>
             <a:off x="3149604" y="2143057"/>
             <a:ext cx="6154662" cy="4671022"/>
           </a:xfrm>
@@ -4174,10 +5200,17 @@
   <p:clrMapOvr>
     <a:masterClrMapping/>
   </p:clrMapOvr>
+  <p:timing>
+    <p:tnLst>
+      <p:par>
+        <p:cTn id="1" dur="indefinite" restart="never" nodeType="tmRoot"/>
+      </p:par>
+    </p:tnLst>
+  </p:timing>
 </p:sld>
 </file>
 
-<file path=ppt/slides/slide18.xml><?xml version="1.0" encoding="utf-8"?>
+<file path=ppt/slides/slide21.xml><?xml version="1.0" encoding="utf-8"?>
 <p:sld xmlns:a="http://schemas.openxmlformats.org/drawingml/2006/main" xmlns:r="http://schemas.openxmlformats.org/officeDocument/2006/relationships" xmlns:p="http://schemas.openxmlformats.org/presentationml/2006/main">
   <p:cSld>
     <p:spTree>
@@ -4502,7 +5535,7 @@
 </p:sld>
 </file>
 
-<file path=ppt/slides/slide19.xml><?xml version="1.0" encoding="utf-8"?>
+<file path=ppt/slides/slide22.xml><?xml version="1.0" encoding="utf-8"?>
 <p:sld xmlns:a="http://schemas.openxmlformats.org/drawingml/2006/main" xmlns:r="http://schemas.openxmlformats.org/officeDocument/2006/relationships" xmlns:p="http://schemas.openxmlformats.org/presentationml/2006/main">
   <p:cSld>
     <p:spTree>
@@ -4628,7 +5661,7 @@
 </p:sld>
 </file>
 
-<file path=ppt/slides/slide2.xml><?xml version="1.0" encoding="utf-8"?>
+<file path=ppt/slides/slide23.xml><?xml version="1.0" encoding="utf-8"?>
 <p:sld xmlns:a="http://schemas.openxmlformats.org/drawingml/2006/main" xmlns:r="http://schemas.openxmlformats.org/officeDocument/2006/relationships" xmlns:p="http://schemas.openxmlformats.org/presentationml/2006/main">
   <p:cSld>
     <p:spTree>
@@ -4660,79 +5693,49 @@
           <a:bodyPr/>
           <a:lstStyle/>
           <a:p>
-            <a:r>
-              <a:rPr lang="ko-KR" altLang="en-US" dirty="0" smtClean="0"/>
-              <a:t>목차</a:t>
+            <a:pPr algn="ctr"/>
+            <a:r>
+              <a:rPr lang="ko-KR" altLang="en-US" dirty="0" smtClean="0"/>
+              <a:t>휴식타임</a:t>
             </a:r>
             <a:endParaRPr lang="ko-KR" altLang="en-US" dirty="0"/>
           </a:p>
         </p:txBody>
       </p:sp>
-      <p:sp>
-        <p:nvSpPr>
-          <p:cNvPr id="3" name="Content Placeholder 2"/>
-          <p:cNvSpPr>
-            <a:spLocks noGrp="1"/>
-          </p:cNvSpPr>
-          <p:nvPr>
-            <p:ph idx="1"/>
-          </p:nvPr>
-        </p:nvSpPr>
-        <p:spPr/>
-        <p:txBody>
-          <a:bodyPr/>
-          <a:lstStyle/>
-          <a:p>
-            <a:r>
-              <a:rPr lang="ko-KR" altLang="en-US" dirty="0" smtClean="0"/>
-              <a:t>가중치 매개변수 최적값을 탐색하는 최적화 방법</a:t>
-            </a:r>
-            <a:endParaRPr lang="en-US" altLang="ko-KR" dirty="0" smtClean="0"/>
-          </a:p>
-          <a:p>
-            <a:r>
-              <a:rPr lang="ko-KR" altLang="en-US" dirty="0" smtClean="0"/>
-              <a:t>가중치 매개변수 초깃값</a:t>
-            </a:r>
-            <a:endParaRPr lang="en-US" altLang="ko-KR" dirty="0" smtClean="0"/>
-          </a:p>
-          <a:p>
-            <a:r>
-              <a:rPr lang="ko-KR" altLang="en-US" dirty="0" smtClean="0"/>
-              <a:t>하이퍼파라미터 설정 방법</a:t>
-            </a:r>
-            <a:endParaRPr lang="en-US" altLang="ko-KR" dirty="0" smtClean="0"/>
-          </a:p>
-          <a:p>
-            <a:r>
-              <a:rPr lang="ko-KR" altLang="en-US" dirty="0" smtClean="0"/>
-              <a:t>가중치 감소</a:t>
-            </a:r>
-            <a:endParaRPr lang="en-US" altLang="ko-KR" dirty="0" smtClean="0"/>
-          </a:p>
-          <a:p>
-            <a:r>
-              <a:rPr lang="ko-KR" altLang="en-US" dirty="0" smtClean="0"/>
-              <a:t>드롭아웃</a:t>
-            </a:r>
-            <a:r>
-              <a:rPr lang="en-US" altLang="ko-KR" dirty="0" smtClean="0"/>
-              <a:t>(Dropout)</a:t>
-            </a:r>
-          </a:p>
-          <a:p>
-            <a:r>
-              <a:rPr lang="ko-KR" altLang="en-US" dirty="0" smtClean="0"/>
-              <a:t>배치 정규화</a:t>
-            </a:r>
-            <a:endParaRPr lang="ko-KR" altLang="en-US" dirty="0"/>
-          </a:p>
-        </p:txBody>
-      </p:sp>
+      <p:pic>
+        <p:nvPicPr>
+          <p:cNvPr id="6" name="Picture 5"/>
+          <p:cNvPicPr>
+            <a:picLocks noChangeAspect="1"/>
+          </p:cNvPicPr>
+          <p:nvPr/>
+        </p:nvPicPr>
+        <p:blipFill>
+          <a:blip r:embed="rId2">
+            <a:extLst>
+              <a:ext uri="{28A0092B-C50C-407E-A947-70E740481C1C}">
+                <a14:useLocalDpi xmlns:a14="http://schemas.microsoft.com/office/drawing/2010/main" val="0"/>
+              </a:ext>
+            </a:extLst>
+          </a:blip>
+          <a:stretch>
+            <a:fillRect/>
+          </a:stretch>
+        </p:blipFill>
+        <p:spPr>
+          <a:xfrm>
+            <a:off x="3013364" y="1540164"/>
+            <a:ext cx="6350000" cy="4775200"/>
+          </a:xfrm>
+          <a:prstGeom prst="rect">
+            <a:avLst/>
+          </a:prstGeom>
+        </p:spPr>
+      </p:pic>
     </p:spTree>
     <p:extLst>
       <p:ext uri="{BB962C8B-B14F-4D97-AF65-F5344CB8AC3E}">
-        <p14:creationId xmlns:p14="http://schemas.microsoft.com/office/powerpoint/2010/main" val="2038353852"/>
+        <p14:creationId xmlns:p14="http://schemas.microsoft.com/office/powerpoint/2010/main" val="2949550737"/>
       </p:ext>
     </p:extLst>
   </p:cSld>
@@ -4749,7 +5752,7 @@
 </p:sld>
 </file>
 
-<file path=ppt/slides/slide20.xml><?xml version="1.0" encoding="utf-8"?>
+<file path=ppt/slides/slide24.xml><?xml version="1.0" encoding="utf-8"?>
 <p:sld xmlns:a="http://schemas.openxmlformats.org/drawingml/2006/main" xmlns:r="http://schemas.openxmlformats.org/officeDocument/2006/relationships" xmlns:p="http://schemas.openxmlformats.org/presentationml/2006/main">
   <p:cSld>
     <p:spTree>
@@ -4810,23 +5813,44 @@
           <a:p>
             <a:r>
               <a:rPr lang="ko-KR" altLang="en-US" dirty="0" smtClean="0"/>
-              <a:t>신경망 학습에서 특히 중요한 것이 가중치의 초깃값</a:t>
+              <a:t>신경망 학습에서 특히 중요한 것이 </a:t>
+            </a:r>
+            <a:r>
+              <a:rPr lang="ko-KR" altLang="en-US" dirty="0" smtClean="0">
+                <a:solidFill>
+                  <a:srgbClr val="FF0000"/>
+                </a:solidFill>
+              </a:rPr>
+              <a:t>가중치의 초깃값</a:t>
+            </a:r>
+            <a:endParaRPr lang="en-US" altLang="ko-KR" dirty="0" smtClean="0">
+              <a:solidFill>
+                <a:srgbClr val="FF0000"/>
+              </a:solidFill>
+            </a:endParaRPr>
+          </a:p>
+          <a:p>
+            <a:r>
+              <a:rPr lang="ko-KR" altLang="en-US" dirty="0" smtClean="0"/>
+              <a:t>가중치의 초깃값을 무엇으로 설정하는냐가 신경망 학습의 </a:t>
+            </a:r>
+            <a:r>
+              <a:rPr lang="ko-KR" altLang="en-US" dirty="0" smtClean="0">
+                <a:solidFill>
+                  <a:srgbClr val="FF0000"/>
+                </a:solidFill>
+              </a:rPr>
+              <a:t>성패</a:t>
+            </a:r>
+            <a:r>
+              <a:rPr lang="ko-KR" altLang="en-US" dirty="0" smtClean="0"/>
+              <a:t>가 가르는 일이 자주 </a:t>
+            </a:r>
+            <a:r>
+              <a:rPr lang="ko-KR" altLang="en-US" dirty="0" smtClean="0"/>
+              <a:t>있다</a:t>
             </a:r>
             <a:endParaRPr lang="en-US" altLang="ko-KR" dirty="0" smtClean="0"/>
-          </a:p>
-          <a:p>
-            <a:r>
-              <a:rPr lang="ko-KR" altLang="en-US" dirty="0" smtClean="0"/>
-              <a:t>가중치의 초깃값을 무엇으로 설정하는냐가 신경망 학습의 성패가 가르는 일이 자주 있다</a:t>
-            </a:r>
-            <a:endParaRPr lang="en-US" altLang="ko-KR" dirty="0" smtClean="0"/>
-          </a:p>
-          <a:p>
-            <a:r>
-              <a:rPr lang="ko-KR" altLang="en-US" dirty="0" smtClean="0"/>
-              <a:t>권장 초기값 설명</a:t>
-            </a:r>
-            <a:endParaRPr lang="ko-KR" altLang="en-US" dirty="0"/>
           </a:p>
         </p:txBody>
       </p:sp>
@@ -4840,10 +5864,17 @@
   <p:clrMapOvr>
     <a:masterClrMapping/>
   </p:clrMapOvr>
+  <p:timing>
+    <p:tnLst>
+      <p:par>
+        <p:cTn id="1" dur="indefinite" restart="never" nodeType="tmRoot"/>
+      </p:par>
+    </p:tnLst>
+  </p:timing>
 </p:sld>
 </file>
 
-<file path=ppt/slides/slide21.xml><?xml version="1.0" encoding="utf-8"?>
+<file path=ppt/slides/slide25.xml><?xml version="1.0" encoding="utf-8"?>
 <p:sld xmlns:a="http://schemas.openxmlformats.org/drawingml/2006/main" xmlns:r="http://schemas.openxmlformats.org/officeDocument/2006/relationships" xmlns:p="http://schemas.openxmlformats.org/presentationml/2006/main">
   <p:cSld>
     <p:spTree>
@@ -4914,31 +5945,12 @@
             </a:r>
             <a:r>
               <a:rPr lang="ko-KR" altLang="en-US" dirty="0" smtClean="0"/>
-              <a:t>초깃값을 </a:t>
-            </a:r>
-            <a:r>
-              <a:rPr lang="en-US" altLang="ko-KR" dirty="0" smtClean="0"/>
-              <a:t>0</a:t>
-            </a:r>
-            <a:r>
-              <a:rPr lang="ko-KR" altLang="en-US" dirty="0" smtClean="0"/>
-              <a:t>으로 하면</a:t>
-            </a:r>
-            <a:r>
-              <a:rPr lang="en-US" altLang="ko-KR" dirty="0" smtClean="0"/>
-              <a:t>?</a:t>
-            </a:r>
+              <a:t>가중치는 작게 유지하는게 목표</a:t>
+            </a:r>
+            <a:endParaRPr lang="en-US" altLang="ko-KR" dirty="0" smtClean="0"/>
           </a:p>
           <a:p>
             <a:pPr lvl="1"/>
-            <a:r>
-              <a:rPr lang="ko-KR" altLang="en-US" dirty="0" smtClean="0"/>
-              <a:t>가중치 감소</a:t>
-            </a:r>
-            <a:r>
-              <a:rPr lang="en-US" altLang="ko-KR" dirty="0" smtClean="0"/>
-              <a:t>(weight decay) – </a:t>
-            </a:r>
             <a:r>
               <a:rPr lang="ko-KR" altLang="en-US" dirty="0" smtClean="0">
                 <a:solidFill>
@@ -4949,7 +5961,15 @@
             </a:r>
             <a:r>
               <a:rPr lang="ko-KR" altLang="en-US" dirty="0" smtClean="0"/>
-              <a:t>을 억제</a:t>
+              <a:t>을 억제하여 범용 성능을 높임</a:t>
+            </a:r>
+            <a:endParaRPr lang="en-US" altLang="ko-KR" dirty="0" smtClean="0"/>
+          </a:p>
+          <a:p>
+            <a:pPr lvl="2"/>
+            <a:r>
+              <a:rPr lang="ko-KR" altLang="en-US" dirty="0" smtClean="0"/>
+              <a:t>오버피팅은 가중치 매개변수의 값이 커서 발생하는 경우가 많다고 함</a:t>
             </a:r>
             <a:endParaRPr lang="en-US" altLang="ko-KR" dirty="0" smtClean="0"/>
           </a:p>
@@ -4969,69 +5989,13 @@
             </a:r>
             <a:r>
               <a:rPr lang="ko-KR" altLang="en-US" dirty="0" smtClean="0"/>
-              <a:t> 하기 위해 초깃값도 최대한 작은 값에서 시작</a:t>
+              <a:t> 하기 위해 초깃값도 최대한 작은 값에서 </a:t>
+            </a:r>
+            <a:r>
+              <a:rPr lang="ko-KR" altLang="en-US" dirty="0" smtClean="0"/>
+              <a:t>시작</a:t>
             </a:r>
             <a:endParaRPr lang="en-US" altLang="ko-KR" dirty="0" smtClean="0"/>
-          </a:p>
-          <a:p>
-            <a:pPr lvl="1"/>
-            <a:r>
-              <a:rPr lang="ko-KR" altLang="en-US" dirty="0" smtClean="0"/>
-              <a:t>가중치의 초깃값을 모두 </a:t>
-            </a:r>
-            <a:r>
-              <a:rPr lang="en-US" altLang="ko-KR" dirty="0" smtClean="0"/>
-              <a:t>0</a:t>
-            </a:r>
-            <a:r>
-              <a:rPr lang="ko-KR" altLang="en-US" dirty="0" smtClean="0"/>
-              <a:t>으로 설정하면</a:t>
-            </a:r>
-            <a:r>
-              <a:rPr lang="en-US" altLang="ko-KR" dirty="0" smtClean="0"/>
-              <a:t>? </a:t>
-            </a:r>
-            <a:r>
-              <a:rPr lang="ko-KR" altLang="en-US" dirty="0" smtClean="0"/>
-              <a:t>학습이 올바로 이루어지지 않음</a:t>
-            </a:r>
-            <a:endParaRPr lang="en-US" altLang="ko-KR" dirty="0" smtClean="0"/>
-          </a:p>
-          <a:p>
-            <a:pPr lvl="1"/>
-            <a:r>
-              <a:rPr lang="ko-KR" altLang="en-US" dirty="0" smtClean="0"/>
-              <a:t>이유는</a:t>
-            </a:r>
-            <a:r>
-              <a:rPr lang="en-US" altLang="ko-KR" dirty="0" smtClean="0"/>
-              <a:t>? </a:t>
-            </a:r>
-            <a:r>
-              <a:rPr lang="ko-KR" altLang="en-US" dirty="0" smtClean="0"/>
-              <a:t>오차역전파법에서 모든 가중치의 값이 똑같이 갱신되기 때문</a:t>
-            </a:r>
-            <a:r>
-              <a:rPr lang="en-US" altLang="ko-KR" dirty="0" smtClean="0"/>
-              <a:t>. </a:t>
-            </a:r>
-            <a:r>
-              <a:rPr lang="ko-KR" altLang="en-US" dirty="0" smtClean="0"/>
-              <a:t>가중치들은 같은 초깃값에서 시작하고 갱신을 거쳐도 여전히 같은 값을 유지</a:t>
-            </a:r>
-            <a:r>
-              <a:rPr lang="en-US" altLang="ko-KR" dirty="0" smtClean="0"/>
-              <a:t>. </a:t>
-            </a:r>
-            <a:r>
-              <a:rPr lang="ko-KR" altLang="en-US" dirty="0" smtClean="0"/>
-              <a:t>가중치를 여러 개 갖는 의미를 사라지게 함</a:t>
-            </a:r>
-            <a:r>
-              <a:rPr lang="en-US" altLang="ko-KR" dirty="0" smtClean="0"/>
-              <a:t>.</a:t>
-            </a:r>
-            <a:endParaRPr lang="ko-KR" altLang="en-US" dirty="0"/>
           </a:p>
         </p:txBody>
       </p:sp>
@@ -5057,8 +6021,8 @@
         </p:blipFill>
         <p:spPr>
           <a:xfrm>
-            <a:off x="8820514" y="2288139"/>
-            <a:ext cx="3048425" cy="362001"/>
+            <a:off x="2549024" y="3710538"/>
+            <a:ext cx="6476605" cy="769098"/>
           </a:xfrm>
           <a:prstGeom prst="rect">
             <a:avLst/>
@@ -5075,10 +6039,17 @@
   <p:clrMapOvr>
     <a:masterClrMapping/>
   </p:clrMapOvr>
+  <p:timing>
+    <p:tnLst>
+      <p:par>
+        <p:cTn id="1" dur="indefinite" restart="never" nodeType="tmRoot"/>
+      </p:par>
+    </p:tnLst>
+  </p:timing>
 </p:sld>
 </file>
 
-<file path=ppt/slides/slide22.xml><?xml version="1.0" encoding="utf-8"?>
+<file path=ppt/slides/slide26.xml><?xml version="1.0" encoding="utf-8"?>
 <p:sld xmlns:a="http://schemas.openxmlformats.org/drawingml/2006/main" xmlns:r="http://schemas.openxmlformats.org/officeDocument/2006/relationships" xmlns:p="http://schemas.openxmlformats.org/presentationml/2006/main">
   <p:cSld>
     <p:spTree>
@@ -5131,12 +6102,192 @@
             <p:ph idx="1"/>
           </p:nvPr>
         </p:nvSpPr>
+        <p:spPr>
+          <a:xfrm>
+            <a:off x="838200" y="1825625"/>
+            <a:ext cx="10515600" cy="4612120"/>
+          </a:xfrm>
+        </p:spPr>
+        <p:txBody>
+          <a:bodyPr>
+            <a:normAutofit/>
+          </a:bodyPr>
+          <a:lstStyle/>
+          <a:p>
+            <a:r>
+              <a:rPr lang="en-US" altLang="ko-KR" dirty="0" smtClean="0"/>
+              <a:t>6.2.1 </a:t>
+            </a:r>
+            <a:r>
+              <a:rPr lang="ko-KR" altLang="en-US" dirty="0" smtClean="0"/>
+              <a:t>초깃값을 </a:t>
+            </a:r>
+            <a:r>
+              <a:rPr lang="en-US" altLang="ko-KR" dirty="0" smtClean="0"/>
+              <a:t>0</a:t>
+            </a:r>
+            <a:r>
+              <a:rPr lang="ko-KR" altLang="en-US" dirty="0" smtClean="0"/>
+              <a:t>으로 하면</a:t>
+            </a:r>
+            <a:r>
+              <a:rPr lang="en-US" altLang="ko-KR" dirty="0" smtClean="0"/>
+              <a:t>?</a:t>
+            </a:r>
+          </a:p>
+          <a:p>
+            <a:pPr lvl="1"/>
+            <a:r>
+              <a:rPr lang="ko-KR" altLang="en-US" dirty="0" smtClean="0"/>
+              <a:t>가중치의 </a:t>
+            </a:r>
+            <a:r>
+              <a:rPr lang="ko-KR" altLang="en-US" dirty="0" smtClean="0"/>
+              <a:t>초깃값을 모두 </a:t>
+            </a:r>
+            <a:r>
+              <a:rPr lang="en-US" altLang="ko-KR" dirty="0" smtClean="0"/>
+              <a:t>0</a:t>
+            </a:r>
+            <a:r>
+              <a:rPr lang="ko-KR" altLang="en-US" dirty="0" smtClean="0"/>
+              <a:t>으로 설정하면</a:t>
+            </a:r>
+            <a:r>
+              <a:rPr lang="en-US" altLang="ko-KR" dirty="0" smtClean="0"/>
+              <a:t>? </a:t>
+            </a:r>
+            <a:r>
+              <a:rPr lang="ko-KR" altLang="en-US" dirty="0" smtClean="0">
+                <a:solidFill>
+                  <a:srgbClr val="FF0000"/>
+                </a:solidFill>
+              </a:rPr>
+              <a:t>학습이 올바로 이루어지지 않음</a:t>
+            </a:r>
+            <a:endParaRPr lang="en-US" altLang="ko-KR" dirty="0" smtClean="0">
+              <a:solidFill>
+                <a:srgbClr val="FF0000"/>
+              </a:solidFill>
+            </a:endParaRPr>
+          </a:p>
+          <a:p>
+            <a:pPr lvl="1"/>
+            <a:r>
+              <a:rPr lang="ko-KR" altLang="en-US" dirty="0" smtClean="0"/>
+              <a:t>이유는</a:t>
+            </a:r>
+            <a:r>
+              <a:rPr lang="en-US" altLang="ko-KR" dirty="0" smtClean="0"/>
+              <a:t>? </a:t>
+            </a:r>
+            <a:r>
+              <a:rPr lang="ko-KR" altLang="en-US" dirty="0" smtClean="0"/>
+              <a:t>오차역전파법에서 모든 가중치의 값이 똑같이 갱신되기 때문</a:t>
+            </a:r>
+            <a:r>
+              <a:rPr lang="en-US" altLang="ko-KR" dirty="0" smtClean="0"/>
+              <a:t>. </a:t>
+            </a:r>
+            <a:r>
+              <a:rPr lang="ko-KR" altLang="en-US" dirty="0" smtClean="0"/>
+              <a:t>가중치들은 같은 초깃값에서 시작하고 갱신을 거쳐도 여전히 같은 값을 유지</a:t>
+            </a:r>
+            <a:r>
+              <a:rPr lang="en-US" altLang="ko-KR" dirty="0" smtClean="0"/>
+              <a:t>. </a:t>
+            </a:r>
+            <a:r>
+              <a:rPr lang="ko-KR" altLang="en-US" dirty="0" smtClean="0"/>
+              <a:t>가중치를 여러 개 갖는 의미를 사라지게 함</a:t>
+            </a:r>
+            <a:r>
+              <a:rPr lang="en-US" altLang="ko-KR" dirty="0" smtClean="0"/>
+              <a:t>.</a:t>
+            </a:r>
+            <a:endParaRPr lang="ko-KR" altLang="en-US" dirty="0"/>
+          </a:p>
+        </p:txBody>
+      </p:sp>
+    </p:spTree>
+    <p:extLst>
+      <p:ext uri="{BB962C8B-B14F-4D97-AF65-F5344CB8AC3E}">
+        <p14:creationId xmlns:p14="http://schemas.microsoft.com/office/powerpoint/2010/main" val="2239236539"/>
+      </p:ext>
+    </p:extLst>
+  </p:cSld>
+  <p:clrMapOvr>
+    <a:masterClrMapping/>
+  </p:clrMapOvr>
+  <p:timing>
+    <p:tnLst>
+      <p:par>
+        <p:cTn id="1" dur="indefinite" restart="never" nodeType="tmRoot"/>
+      </p:par>
+    </p:tnLst>
+  </p:timing>
+</p:sld>
+</file>
+
+<file path=ppt/slides/slide27.xml><?xml version="1.0" encoding="utf-8"?>
+<p:sld xmlns:a="http://schemas.openxmlformats.org/drawingml/2006/main" xmlns:r="http://schemas.openxmlformats.org/officeDocument/2006/relationships" xmlns:p="http://schemas.openxmlformats.org/presentationml/2006/main">
+  <p:cSld>
+    <p:spTree>
+      <p:nvGrpSpPr>
+        <p:cNvPr id="1" name=""/>
+        <p:cNvGrpSpPr/>
+        <p:nvPr/>
+      </p:nvGrpSpPr>
+      <p:grpSpPr>
+        <a:xfrm>
+          <a:off x="0" y="0"/>
+          <a:ext cx="0" cy="0"/>
+          <a:chOff x="0" y="0"/>
+          <a:chExt cx="0" cy="0"/>
+        </a:xfrm>
+      </p:grpSpPr>
+      <p:sp>
+        <p:nvSpPr>
+          <p:cNvPr id="2" name="Title 1"/>
+          <p:cNvSpPr>
+            <a:spLocks noGrp="1"/>
+          </p:cNvSpPr>
+          <p:nvPr>
+            <p:ph type="title"/>
+          </p:nvPr>
+        </p:nvSpPr>
         <p:spPr/>
         <p:txBody>
           <a:bodyPr/>
           <a:lstStyle/>
           <a:p>
             <a:r>
+              <a:rPr lang="en-US" altLang="ko-KR" dirty="0"/>
+              <a:t>6.2 </a:t>
+            </a:r>
+            <a:r>
+              <a:rPr lang="ko-KR" altLang="en-US" dirty="0"/>
+              <a:t>가중치의 초깃값</a:t>
+            </a:r>
+          </a:p>
+        </p:txBody>
+      </p:sp>
+      <p:sp>
+        <p:nvSpPr>
+          <p:cNvPr id="3" name="Content Placeholder 2"/>
+          <p:cNvSpPr>
+            <a:spLocks noGrp="1"/>
+          </p:cNvSpPr>
+          <p:nvPr>
+            <p:ph idx="1"/>
+          </p:nvPr>
+        </p:nvSpPr>
+        <p:spPr/>
+        <p:txBody>
+          <a:bodyPr/>
+          <a:lstStyle/>
+          <a:p>
+            <a:r>
               <a:rPr lang="en-US" altLang="ko-KR" dirty="0" smtClean="0"/>
               <a:t>6.2.2 </a:t>
             </a:r>
@@ -5157,7 +6308,11 @@
               <a:t>(</a:t>
             </a:r>
             <a:r>
-              <a:rPr lang="ko-KR" altLang="en-US" dirty="0" smtClean="0"/>
+              <a:rPr lang="ko-KR" altLang="en-US" dirty="0" smtClean="0">
+                <a:solidFill>
+                  <a:srgbClr val="FF0000"/>
+                </a:solidFill>
+              </a:rPr>
               <a:t>활성화 함수의 출력 데이터</a:t>
             </a:r>
             <a:r>
@@ -5180,6 +6335,10 @@
               <a:rPr lang="en-US" altLang="ko-KR" dirty="0" smtClean="0"/>
               <a:t>?</a:t>
             </a:r>
+          </a:p>
+          <a:p>
+            <a:pPr lvl="1"/>
+            <a:endParaRPr lang="en-US" altLang="ko-KR" dirty="0" smtClean="0"/>
           </a:p>
           <a:p>
             <a:pPr lvl="1"/>
@@ -5217,10 +6376,17 @@
   <p:clrMapOvr>
     <a:masterClrMapping/>
   </p:clrMapOvr>
+  <p:timing>
+    <p:tnLst>
+      <p:par>
+        <p:cTn id="1" dur="indefinite" restart="never" nodeType="tmRoot"/>
+      </p:par>
+    </p:tnLst>
+  </p:timing>
 </p:sld>
 </file>
 
-<file path=ppt/slides/slide23.xml><?xml version="1.0" encoding="utf-8"?>
+<file path=ppt/slides/slide28.xml><?xml version="1.0" encoding="utf-8"?>
 <p:sld xmlns:a="http://schemas.openxmlformats.org/drawingml/2006/main" xmlns:r="http://schemas.openxmlformats.org/officeDocument/2006/relationships" xmlns:p="http://schemas.openxmlformats.org/presentationml/2006/main">
   <p:cSld>
     <p:spTree>
@@ -9150,10 +10316,17 @@
   <p:clrMapOvr>
     <a:masterClrMapping/>
   </p:clrMapOvr>
+  <p:timing>
+    <p:tnLst>
+      <p:par>
+        <p:cTn id="1" dur="indefinite" restart="never" nodeType="tmRoot"/>
+      </p:par>
+    </p:tnLst>
+  </p:timing>
 </p:sld>
 </file>
 
-<file path=ppt/slides/slide24.xml><?xml version="1.0" encoding="utf-8"?>
+<file path=ppt/slides/slide29.xml><?xml version="1.0" encoding="utf-8"?>
 <p:sld xmlns:a="http://schemas.openxmlformats.org/drawingml/2006/main" xmlns:r="http://schemas.openxmlformats.org/officeDocument/2006/relationships" xmlns:p="http://schemas.openxmlformats.org/presentationml/2006/main">
   <p:cSld>
     <p:spTree>
@@ -9373,10 +10546,17 @@
   <p:clrMapOvr>
     <a:masterClrMapping/>
   </p:clrMapOvr>
+  <p:timing>
+    <p:tnLst>
+      <p:par>
+        <p:cTn id="1" dur="indefinite" restart="never" nodeType="tmRoot"/>
+      </p:par>
+    </p:tnLst>
+  </p:timing>
 </p:sld>
 </file>
 
-<file path=ppt/slides/slide25.xml><?xml version="1.0" encoding="utf-8"?>
+<file path=ppt/slides/slide3.xml><?xml version="1.0" encoding="utf-8"?>
 <p:sld xmlns:a="http://schemas.openxmlformats.org/drawingml/2006/main" xmlns:r="http://schemas.openxmlformats.org/officeDocument/2006/relationships" xmlns:p="http://schemas.openxmlformats.org/presentationml/2006/main">
   <p:cSld>
     <p:spTree>
@@ -9409,13 +10589,14 @@
           <a:lstStyle/>
           <a:p>
             <a:r>
-              <a:rPr lang="en-US" altLang="ko-KR" dirty="0"/>
-              <a:t>6.2 </a:t>
-            </a:r>
-            <a:r>
-              <a:rPr lang="ko-KR" altLang="en-US" dirty="0"/>
-              <a:t>가중치의 초깃값</a:t>
-            </a:r>
+              <a:rPr lang="en-US" altLang="ko-KR" dirty="0" smtClean="0"/>
+              <a:t>6.1 </a:t>
+            </a:r>
+            <a:r>
+              <a:rPr lang="ko-KR" altLang="en-US" dirty="0" smtClean="0"/>
+              <a:t>매개변수 갱신</a:t>
+            </a:r>
+            <a:endParaRPr lang="ko-KR" altLang="en-US" dirty="0"/>
           </a:p>
         </p:txBody>
       </p:sp>
@@ -9429,39 +10610,77 @@
             <p:ph idx="1"/>
           </p:nvPr>
         </p:nvSpPr>
-        <p:spPr>
-          <a:xfrm>
-            <a:off x="838200" y="1825625"/>
-            <a:ext cx="10515600" cy="2072120"/>
-          </a:xfrm>
-        </p:spPr>
+        <p:spPr/>
         <p:txBody>
           <a:bodyPr/>
           <a:lstStyle/>
           <a:p>
             <a:r>
-              <a:rPr lang="en-US" altLang="ko-KR" dirty="0" smtClean="0"/>
-              <a:t>6.2.2 </a:t>
-            </a:r>
-            <a:r>
-              <a:rPr lang="ko-KR" altLang="en-US" dirty="0" smtClean="0"/>
-              <a:t>은닉층의 활성화값 분포</a:t>
+              <a:rPr lang="ko-KR" altLang="en-US" dirty="0" smtClean="0"/>
+              <a:t>신경망 학습의 목적</a:t>
+            </a:r>
+            <a:r>
+              <a:rPr lang="en-US" altLang="ko-KR" dirty="0" smtClean="0"/>
+              <a:t>? </a:t>
+            </a:r>
+            <a:r>
+              <a:rPr lang="ko-KR" altLang="en-US" dirty="0" smtClean="0"/>
+              <a:t>손실함수의 값을 낮추는 매개변수 찾는 것</a:t>
             </a:r>
             <a:endParaRPr lang="en-US" altLang="ko-KR" dirty="0" smtClean="0"/>
           </a:p>
           <a:p>
+            <a:r>
+              <a:rPr lang="ko-KR" altLang="en-US" dirty="0" smtClean="0"/>
+              <a:t>즉 매개변수의 최적값을 찾는 문제</a:t>
+            </a:r>
+            <a:endParaRPr lang="en-US" altLang="ko-KR" dirty="0" smtClean="0"/>
+          </a:p>
+          <a:p>
+            <a:r>
+              <a:rPr lang="ko-KR" altLang="en-US" dirty="0" smtClean="0"/>
+              <a:t>이러한 문제를 푸는 것을 </a:t>
+            </a:r>
+            <a:r>
+              <a:rPr lang="ko-KR" altLang="en-US" dirty="0" smtClean="0">
+                <a:solidFill>
+                  <a:srgbClr val="FF0000"/>
+                </a:solidFill>
+              </a:rPr>
+              <a:t>최적화</a:t>
+            </a:r>
+            <a:r>
+              <a:rPr lang="en-US" altLang="ko-KR" dirty="0" smtClean="0">
+                <a:solidFill>
+                  <a:srgbClr val="FF0000"/>
+                </a:solidFill>
+              </a:rPr>
+              <a:t>(optimization)</a:t>
+            </a:r>
+            <a:r>
+              <a:rPr lang="ko-KR" altLang="en-US" dirty="0" smtClean="0"/>
+              <a:t>라고 합니다</a:t>
+            </a:r>
+            <a:r>
+              <a:rPr lang="en-US" altLang="ko-KR" dirty="0" smtClean="0"/>
+              <a:t>.</a:t>
+            </a:r>
+          </a:p>
+          <a:p>
+            <a:endParaRPr lang="en-US" altLang="ko-KR" dirty="0"/>
+          </a:p>
+          <a:p>
+            <a:r>
+              <a:rPr lang="ko-KR" altLang="en-US" dirty="0" smtClean="0"/>
+              <a:t>신경망의 최적화는 굉장히 어려운 문제</a:t>
+            </a:r>
+            <a:endParaRPr lang="en-US" altLang="ko-KR" dirty="0" smtClean="0"/>
+          </a:p>
+          <a:p>
             <a:pPr lvl="1"/>
             <a:r>
               <a:rPr lang="ko-KR" altLang="en-US" dirty="0" smtClean="0"/>
-              <a:t>표준편차를 </a:t>
-            </a:r>
-            <a:r>
-              <a:rPr lang="en-US" altLang="ko-KR" dirty="0" smtClean="0"/>
-              <a:t>0.01</a:t>
-            </a:r>
-            <a:r>
-              <a:rPr lang="ko-KR" altLang="en-US" dirty="0" smtClean="0"/>
-              <a:t>로 바꿔서 실험</a:t>
+              <a:t>매개변수 공간은 매우 넓고 복잡</a:t>
             </a:r>
             <a:endParaRPr lang="en-US" altLang="ko-KR" dirty="0" smtClean="0"/>
           </a:p>
@@ -9469,72 +10688,33 @@
             <a:pPr lvl="1"/>
             <a:r>
               <a:rPr lang="ko-KR" altLang="en-US" dirty="0" smtClean="0"/>
-              <a:t>기울기소실 문제는 일어나지 않았지만 표현력에 문제가 있음</a:t>
-            </a:r>
-            <a:endParaRPr lang="en-US" altLang="ko-KR" dirty="0" smtClean="0"/>
-          </a:p>
-          <a:p>
-            <a:pPr lvl="1"/>
-            <a:r>
-              <a:rPr lang="ko-KR" altLang="en-US" dirty="0" smtClean="0"/>
-              <a:t>많은 값들이 같은 값을 출력한다면 뉴런 </a:t>
-            </a:r>
-            <a:r>
-              <a:rPr lang="en-US" altLang="ko-KR" dirty="0" smtClean="0"/>
-              <a:t>1</a:t>
-            </a:r>
-            <a:r>
-              <a:rPr lang="ko-KR" altLang="en-US" dirty="0" smtClean="0"/>
-              <a:t>개짜리와 별반 다른게 없다</a:t>
-            </a:r>
-            <a:endParaRPr lang="en-US" altLang="ko-KR" dirty="0" smtClean="0"/>
-          </a:p>
-        </p:txBody>
-      </p:sp>
-      <p:pic>
-        <p:nvPicPr>
-          <p:cNvPr id="4" name="Picture 3"/>
-          <p:cNvPicPr>
-            <a:picLocks noChangeAspect="1"/>
-          </p:cNvPicPr>
-          <p:nvPr/>
-        </p:nvPicPr>
-        <p:blipFill>
-          <a:blip r:embed="rId2">
-            <a:extLst>
-              <a:ext uri="{28A0092B-C50C-407E-A947-70E740481C1C}">
-                <a14:useLocalDpi xmlns:a14="http://schemas.microsoft.com/office/drawing/2010/main" val="0"/>
-              </a:ext>
-            </a:extLst>
-          </a:blip>
-          <a:stretch>
-            <a:fillRect/>
-          </a:stretch>
-        </p:blipFill>
-        <p:spPr>
-          <a:xfrm>
-            <a:off x="1903432" y="3592941"/>
-            <a:ext cx="8145951" cy="3115880"/>
-          </a:xfrm>
-          <a:prstGeom prst="rect">
-            <a:avLst/>
-          </a:prstGeom>
-        </p:spPr>
-      </p:pic>
+              <a:t>매개변수의 수가 엄청나게 많음</a:t>
+            </a:r>
+            <a:endParaRPr lang="ko-KR" altLang="en-US" dirty="0"/>
+          </a:p>
+        </p:txBody>
+      </p:sp>
     </p:spTree>
     <p:extLst>
       <p:ext uri="{BB962C8B-B14F-4D97-AF65-F5344CB8AC3E}">
-        <p14:creationId xmlns:p14="http://schemas.microsoft.com/office/powerpoint/2010/main" val="34782713"/>
+        <p14:creationId xmlns:p14="http://schemas.microsoft.com/office/powerpoint/2010/main" val="2509572580"/>
       </p:ext>
     </p:extLst>
   </p:cSld>
   <p:clrMapOvr>
     <a:masterClrMapping/>
   </p:clrMapOvr>
+  <p:timing>
+    <p:tnLst>
+      <p:par>
+        <p:cTn id="1" dur="indefinite" restart="never" nodeType="tmRoot"/>
+      </p:par>
+    </p:tnLst>
+  </p:timing>
 </p:sld>
 </file>
 
-<file path=ppt/slides/slide26.xml><?xml version="1.0" encoding="utf-8"?>
+<file path=ppt/slides/slide30.xml><?xml version="1.0" encoding="utf-8"?>
 <p:sld xmlns:a="http://schemas.openxmlformats.org/drawingml/2006/main" xmlns:r="http://schemas.openxmlformats.org/officeDocument/2006/relationships" xmlns:p="http://schemas.openxmlformats.org/presentationml/2006/main">
   <p:cSld>
     <p:spTree>
@@ -9587,74 +10767,39 @@
             <p:ph idx="1"/>
           </p:nvPr>
         </p:nvSpPr>
-        <p:spPr/>
+        <p:spPr>
+          <a:xfrm>
+            <a:off x="838200" y="1825625"/>
+            <a:ext cx="10515600" cy="2072120"/>
+          </a:xfrm>
+        </p:spPr>
         <p:txBody>
           <a:bodyPr/>
           <a:lstStyle/>
           <a:p>
             <a:r>
-              <a:rPr lang="en-US" altLang="ko-KR" dirty="0"/>
+              <a:rPr lang="en-US" altLang="ko-KR" dirty="0" smtClean="0"/>
               <a:t>6.2.2 </a:t>
             </a:r>
             <a:r>
-              <a:rPr lang="ko-KR" altLang="en-US" dirty="0"/>
+              <a:rPr lang="ko-KR" altLang="en-US" dirty="0" smtClean="0"/>
               <a:t>은닉층의 활성화값 분포</a:t>
             </a:r>
-            <a:endParaRPr lang="en-US" altLang="ko-KR" dirty="0"/>
+            <a:endParaRPr lang="en-US" altLang="ko-KR" dirty="0" smtClean="0"/>
           </a:p>
           <a:p>
             <a:pPr lvl="1"/>
             <a:r>
               <a:rPr lang="ko-KR" altLang="en-US" dirty="0" smtClean="0"/>
-              <a:t>사비에르 글로로트</a:t>
-            </a:r>
-            <a:r>
-              <a:rPr lang="en-US" altLang="ko-KR" dirty="0" smtClean="0"/>
-              <a:t>(Xavier </a:t>
-            </a:r>
-            <a:r>
-              <a:rPr lang="en-US" altLang="ko-KR" dirty="0" err="1" smtClean="0"/>
-              <a:t>Glorot</a:t>
-            </a:r>
-            <a:r>
-              <a:rPr lang="en-US" altLang="ko-KR" dirty="0" smtClean="0"/>
-              <a:t>)</a:t>
-            </a:r>
-            <a:r>
-              <a:rPr lang="ko-KR" altLang="en-US" dirty="0" smtClean="0"/>
-              <a:t>와 요슈아 벤지오</a:t>
-            </a:r>
-            <a:r>
-              <a:rPr lang="en-US" altLang="ko-KR" dirty="0" smtClean="0"/>
-              <a:t>(</a:t>
-            </a:r>
-            <a:r>
-              <a:rPr lang="en-US" altLang="ko-KR" dirty="0" err="1" smtClean="0"/>
-              <a:t>Yoshua</a:t>
-            </a:r>
-            <a:r>
-              <a:rPr lang="en-US" altLang="ko-KR" dirty="0" smtClean="0"/>
-              <a:t> </a:t>
-            </a:r>
-            <a:r>
-              <a:rPr lang="en-US" altLang="ko-KR" dirty="0" err="1" smtClean="0"/>
-              <a:t>Bengio</a:t>
-            </a:r>
-            <a:r>
-              <a:rPr lang="en-US" altLang="ko-KR" dirty="0" smtClean="0"/>
-              <a:t>)</a:t>
-            </a:r>
-            <a:r>
-              <a:rPr lang="ko-KR" altLang="en-US" dirty="0" smtClean="0"/>
-              <a:t>의 논문에서 권장하는 가중치 초깃값인 </a:t>
-            </a:r>
-            <a:r>
-              <a:rPr lang="en-US" altLang="ko-KR" dirty="0" smtClean="0"/>
-              <a:t>Xavier </a:t>
-            </a:r>
-            <a:r>
-              <a:rPr lang="ko-KR" altLang="en-US" dirty="0" smtClean="0"/>
-              <a:t>초깃값을 써보자</a:t>
+              <a:t>표준편차를 </a:t>
+            </a:r>
+            <a:r>
+              <a:rPr lang="en-US" altLang="ko-KR" dirty="0" smtClean="0"/>
+              <a:t>0.01</a:t>
+            </a:r>
+            <a:r>
+              <a:rPr lang="ko-KR" altLang="en-US" dirty="0" smtClean="0"/>
+              <a:t>로 바꿔서 실험</a:t>
             </a:r>
             <a:endParaRPr lang="en-US" altLang="ko-KR" dirty="0" smtClean="0"/>
           </a:p>
@@ -9662,17 +10807,37 @@
             <a:pPr lvl="1"/>
             <a:r>
               <a:rPr lang="ko-KR" altLang="en-US" dirty="0" smtClean="0"/>
-              <a:t>앞 계층의 노드가 </a:t>
-            </a:r>
-            <a:r>
-              <a:rPr lang="en-US" altLang="ko-KR" dirty="0" smtClean="0"/>
-              <a:t>n</a:t>
-            </a:r>
-            <a:r>
-              <a:rPr lang="ko-KR" altLang="en-US" dirty="0" smtClean="0"/>
-              <a:t>개라면 표준편차가 </a:t>
-            </a:r>
-            <a:endParaRPr lang="ko-KR" altLang="en-US" dirty="0"/>
+              <a:t>기울기소실 문제는 일어나지 않았지만 </a:t>
+            </a:r>
+            <a:r>
+              <a:rPr lang="ko-KR" altLang="en-US" dirty="0" smtClean="0">
+                <a:solidFill>
+                  <a:srgbClr val="FF0000"/>
+                </a:solidFill>
+              </a:rPr>
+              <a:t>표현력에 문제</a:t>
+            </a:r>
+            <a:r>
+              <a:rPr lang="ko-KR" altLang="en-US" dirty="0" smtClean="0"/>
+              <a:t>가 있음</a:t>
+            </a:r>
+            <a:endParaRPr lang="en-US" altLang="ko-KR" dirty="0" smtClean="0"/>
+          </a:p>
+          <a:p>
+            <a:pPr lvl="1"/>
+            <a:r>
+              <a:rPr lang="ko-KR" altLang="en-US" dirty="0" smtClean="0"/>
+              <a:t>많은 값들이 같은 값을 출력한다면 뉴런 </a:t>
+            </a:r>
+            <a:r>
+              <a:rPr lang="en-US" altLang="ko-KR" dirty="0" smtClean="0"/>
+              <a:t>1</a:t>
+            </a:r>
+            <a:r>
+              <a:rPr lang="ko-KR" altLang="en-US" dirty="0" smtClean="0"/>
+              <a:t>개짜리와 별반 다른게 없다</a:t>
+            </a:r>
+            <a:endParaRPr lang="en-US" altLang="ko-KR" dirty="0" smtClean="0"/>
           </a:p>
         </p:txBody>
       </p:sp>
@@ -9698,38 +10863,8 @@
         </p:blipFill>
         <p:spPr>
           <a:xfrm>
-            <a:off x="6871855" y="2958398"/>
-            <a:ext cx="551017" cy="511344"/>
-          </a:xfrm>
-          <a:prstGeom prst="rect">
-            <a:avLst/>
-          </a:prstGeom>
-        </p:spPr>
-      </p:pic>
-      <p:pic>
-        <p:nvPicPr>
-          <p:cNvPr id="5" name="Picture 4"/>
-          <p:cNvPicPr>
-            <a:picLocks noChangeAspect="1"/>
-          </p:cNvPicPr>
-          <p:nvPr/>
-        </p:nvPicPr>
-        <p:blipFill>
-          <a:blip r:embed="rId3">
-            <a:extLst>
-              <a:ext uri="{28A0092B-C50C-407E-A947-70E740481C1C}">
-                <a14:useLocalDpi xmlns:a14="http://schemas.microsoft.com/office/drawing/2010/main" val="0"/>
-              </a:ext>
-            </a:extLst>
-          </a:blip>
-          <a:stretch>
-            <a:fillRect/>
-          </a:stretch>
-        </p:blipFill>
-        <p:spPr>
-          <a:xfrm>
-            <a:off x="1856868" y="3414326"/>
-            <a:ext cx="8259792" cy="3143491"/>
+            <a:off x="1903432" y="3592941"/>
+            <a:ext cx="8145951" cy="3115880"/>
           </a:xfrm>
           <a:prstGeom prst="rect">
             <a:avLst/>
@@ -9739,17 +10874,24 @@
     </p:spTree>
     <p:extLst>
       <p:ext uri="{BB962C8B-B14F-4D97-AF65-F5344CB8AC3E}">
-        <p14:creationId xmlns:p14="http://schemas.microsoft.com/office/powerpoint/2010/main" val="809020106"/>
+        <p14:creationId xmlns:p14="http://schemas.microsoft.com/office/powerpoint/2010/main" val="34782713"/>
       </p:ext>
     </p:extLst>
   </p:cSld>
   <p:clrMapOvr>
     <a:masterClrMapping/>
   </p:clrMapOvr>
+  <p:timing>
+    <p:tnLst>
+      <p:par>
+        <p:cTn id="1" dur="indefinite" restart="never" nodeType="tmRoot"/>
+      </p:par>
+    </p:tnLst>
+  </p:timing>
 </p:sld>
 </file>
 
-<file path=ppt/slides/slide27.xml><?xml version="1.0" encoding="utf-8"?>
+<file path=ppt/slides/slide31.xml><?xml version="1.0" encoding="utf-8"?>
 <p:sld xmlns:a="http://schemas.openxmlformats.org/drawingml/2006/main" xmlns:r="http://schemas.openxmlformats.org/officeDocument/2006/relationships" xmlns:p="http://schemas.openxmlformats.org/presentationml/2006/main">
   <p:cSld>
     <p:spTree>
@@ -9808,94 +10950,86 @@
           <a:lstStyle/>
           <a:p>
             <a:r>
-              <a:rPr lang="en-US" altLang="ko-KR" dirty="0" smtClean="0"/>
-              <a:t>6.2.3 </a:t>
+              <a:rPr lang="en-US" altLang="ko-KR" dirty="0"/>
+              <a:t>6.2.2 </a:t>
+            </a:r>
+            <a:r>
+              <a:rPr lang="ko-KR" altLang="en-US" dirty="0"/>
+              <a:t>은닉층의 활성화값 분포</a:t>
+            </a:r>
+            <a:endParaRPr lang="en-US" altLang="ko-KR" dirty="0"/>
+          </a:p>
+          <a:p>
+            <a:pPr lvl="1"/>
+            <a:r>
+              <a:rPr lang="ko-KR" altLang="en-US" dirty="0" smtClean="0"/>
+              <a:t>사비에르 글로로트</a:t>
+            </a:r>
+            <a:r>
+              <a:rPr lang="en-US" altLang="ko-KR" dirty="0" smtClean="0"/>
+              <a:t>(Xavier </a:t>
             </a:r>
             <a:r>
               <a:rPr lang="en-US" altLang="ko-KR" dirty="0" err="1" smtClean="0"/>
-              <a:t>ReLU</a:t>
-            </a:r>
-            <a:r>
-              <a:rPr lang="ko-KR" altLang="en-US" dirty="0" smtClean="0"/>
-              <a:t>를 사용할 때의 가중치 초깃값</a:t>
+              <a:t>Glorot</a:t>
+            </a:r>
+            <a:r>
+              <a:rPr lang="en-US" altLang="ko-KR" dirty="0" smtClean="0"/>
+              <a:t>)</a:t>
+            </a:r>
+            <a:r>
+              <a:rPr lang="ko-KR" altLang="en-US" dirty="0" smtClean="0"/>
+              <a:t>와 요슈아 벤지오</a:t>
+            </a:r>
+            <a:r>
+              <a:rPr lang="en-US" altLang="ko-KR" dirty="0" smtClean="0"/>
+              <a:t>(</a:t>
+            </a:r>
+            <a:r>
+              <a:rPr lang="en-US" altLang="ko-KR" dirty="0" err="1" smtClean="0"/>
+              <a:t>Yoshua</a:t>
+            </a:r>
+            <a:r>
+              <a:rPr lang="en-US" altLang="ko-KR" dirty="0" smtClean="0"/>
+              <a:t> </a:t>
+            </a:r>
+            <a:r>
+              <a:rPr lang="en-US" altLang="ko-KR" dirty="0" err="1" smtClean="0"/>
+              <a:t>Bengio</a:t>
+            </a:r>
+            <a:r>
+              <a:rPr lang="en-US" altLang="ko-KR" dirty="0" smtClean="0"/>
+              <a:t>)</a:t>
+            </a:r>
+            <a:r>
+              <a:rPr lang="ko-KR" altLang="en-US" dirty="0" smtClean="0"/>
+              <a:t>의 논문에서 권장하는 가중치 초깃값인 </a:t>
+            </a:r>
+            <a:r>
+              <a:rPr lang="en-US" altLang="ko-KR" dirty="0" smtClean="0"/>
+              <a:t>Xavier </a:t>
+            </a:r>
+            <a:r>
+              <a:rPr lang="ko-KR" altLang="en-US" dirty="0" smtClean="0"/>
+              <a:t>초깃값을 써보자</a:t>
             </a:r>
             <a:endParaRPr lang="en-US" altLang="ko-KR" dirty="0" smtClean="0"/>
           </a:p>
           <a:p>
             <a:pPr lvl="1"/>
             <a:r>
-              <a:rPr lang="en-US" altLang="ko-KR" dirty="0" smtClean="0"/>
-              <a:t>Xavier</a:t>
-            </a:r>
-            <a:r>
-              <a:rPr lang="ko-KR" altLang="en-US" dirty="0" smtClean="0"/>
-              <a:t>초깃값은 활성화 함수가 선형인 것을 전제로 이끈 결과</a:t>
-            </a:r>
-            <a:endParaRPr lang="en-US" altLang="ko-KR" dirty="0" smtClean="0"/>
-          </a:p>
-          <a:p>
-            <a:pPr lvl="1"/>
-            <a:r>
-              <a:rPr lang="ko-KR" altLang="en-US" dirty="0" smtClean="0"/>
-              <a:t>반면 </a:t>
-            </a:r>
-            <a:r>
-              <a:rPr lang="en-US" altLang="ko-KR" dirty="0" err="1" smtClean="0"/>
-              <a:t>ReLU</a:t>
-            </a:r>
-            <a:r>
-              <a:rPr lang="ko-KR" altLang="en-US" dirty="0" smtClean="0"/>
-              <a:t>를 이용할 때는 </a:t>
-            </a:r>
-            <a:r>
-              <a:rPr lang="en-US" altLang="ko-KR" dirty="0" err="1" smtClean="0"/>
-              <a:t>ReLU</a:t>
-            </a:r>
-            <a:r>
-              <a:rPr lang="ko-KR" altLang="en-US" dirty="0" smtClean="0"/>
-              <a:t>에 특화된 초깃값을 이용하라고 권장</a:t>
-            </a:r>
-            <a:endParaRPr lang="en-US" altLang="ko-KR" dirty="0" smtClean="0"/>
-          </a:p>
-          <a:p>
-            <a:pPr lvl="1"/>
-            <a:r>
-              <a:rPr lang="ko-KR" altLang="en-US" dirty="0" smtClean="0"/>
-              <a:t>이 특화된 초깃값을 찾아낸 카이밍 히</a:t>
-            </a:r>
-            <a:r>
-              <a:rPr lang="en-US" altLang="ko-KR" dirty="0" smtClean="0"/>
-              <a:t>(</a:t>
-            </a:r>
-            <a:r>
-              <a:rPr lang="en-US" altLang="ko-KR" dirty="0" err="1" smtClean="0"/>
-              <a:t>Kaiming</a:t>
-            </a:r>
-            <a:r>
-              <a:rPr lang="en-US" altLang="ko-KR" dirty="0" smtClean="0"/>
-              <a:t> He)</a:t>
-            </a:r>
-            <a:r>
-              <a:rPr lang="ko-KR" altLang="en-US" dirty="0" smtClean="0"/>
-              <a:t>의 이름을 따 </a:t>
-            </a:r>
-            <a:r>
-              <a:rPr lang="en-US" altLang="ko-KR" dirty="0" smtClean="0"/>
-              <a:t>He </a:t>
-            </a:r>
-            <a:r>
-              <a:rPr lang="ko-KR" altLang="en-US" dirty="0" smtClean="0"/>
-              <a:t>초깃값이라고 한다</a:t>
-            </a:r>
-            <a:r>
-              <a:rPr lang="en-US" altLang="ko-KR" dirty="0" smtClean="0"/>
-              <a:t>. </a:t>
-            </a:r>
-            <a:r>
-              <a:rPr lang="ko-KR" altLang="en-US" dirty="0" smtClean="0"/>
-              <a:t>표준편차는 </a:t>
-            </a:r>
-            <a:endParaRPr lang="en-US" altLang="ko-KR" dirty="0" smtClean="0"/>
+              <a:rPr lang="ko-KR" altLang="en-US" dirty="0" smtClean="0"/>
+              <a:t>앞 계층의 노드가 </a:t>
+            </a:r>
+            <a:r>
+              <a:rPr lang="en-US" altLang="ko-KR" dirty="0" smtClean="0"/>
+              <a:t>n</a:t>
+            </a:r>
+            <a:r>
+              <a:rPr lang="ko-KR" altLang="en-US" dirty="0" smtClean="0"/>
+              <a:t>개라면 표준편차가 </a:t>
+            </a:r>
+            <a:endParaRPr lang="ko-KR" altLang="en-US" dirty="0"/>
           </a:p>
         </p:txBody>
       </p:sp>
@@ -9921,6 +11055,256 @@
         </p:blipFill>
         <p:spPr>
           <a:xfrm>
+            <a:off x="6871855" y="2958398"/>
+            <a:ext cx="551017" cy="511344"/>
+          </a:xfrm>
+          <a:prstGeom prst="rect">
+            <a:avLst/>
+          </a:prstGeom>
+        </p:spPr>
+      </p:pic>
+      <p:pic>
+        <p:nvPicPr>
+          <p:cNvPr id="5" name="Picture 4"/>
+          <p:cNvPicPr>
+            <a:picLocks noChangeAspect="1"/>
+          </p:cNvPicPr>
+          <p:nvPr/>
+        </p:nvPicPr>
+        <p:blipFill>
+          <a:blip r:embed="rId3">
+            <a:extLst>
+              <a:ext uri="{28A0092B-C50C-407E-A947-70E740481C1C}">
+                <a14:useLocalDpi xmlns:a14="http://schemas.microsoft.com/office/drawing/2010/main" val="0"/>
+              </a:ext>
+            </a:extLst>
+          </a:blip>
+          <a:stretch>
+            <a:fillRect/>
+          </a:stretch>
+        </p:blipFill>
+        <p:spPr>
+          <a:xfrm>
+            <a:off x="1856868" y="3414326"/>
+            <a:ext cx="8259792" cy="3143491"/>
+          </a:xfrm>
+          <a:prstGeom prst="rect">
+            <a:avLst/>
+          </a:prstGeom>
+        </p:spPr>
+      </p:pic>
+    </p:spTree>
+    <p:extLst>
+      <p:ext uri="{BB962C8B-B14F-4D97-AF65-F5344CB8AC3E}">
+        <p14:creationId xmlns:p14="http://schemas.microsoft.com/office/powerpoint/2010/main" val="809020106"/>
+      </p:ext>
+    </p:extLst>
+  </p:cSld>
+  <p:clrMapOvr>
+    <a:masterClrMapping/>
+  </p:clrMapOvr>
+  <p:timing>
+    <p:tnLst>
+      <p:par>
+        <p:cTn id="1" dur="indefinite" restart="never" nodeType="tmRoot"/>
+      </p:par>
+    </p:tnLst>
+  </p:timing>
+</p:sld>
+</file>
+
+<file path=ppt/slides/slide32.xml><?xml version="1.0" encoding="utf-8"?>
+<p:sld xmlns:a="http://schemas.openxmlformats.org/drawingml/2006/main" xmlns:r="http://schemas.openxmlformats.org/officeDocument/2006/relationships" xmlns:p="http://schemas.openxmlformats.org/presentationml/2006/main">
+  <p:cSld>
+    <p:spTree>
+      <p:nvGrpSpPr>
+        <p:cNvPr id="1" name=""/>
+        <p:cNvGrpSpPr/>
+        <p:nvPr/>
+      </p:nvGrpSpPr>
+      <p:grpSpPr>
+        <a:xfrm>
+          <a:off x="0" y="0"/>
+          <a:ext cx="0" cy="0"/>
+          <a:chOff x="0" y="0"/>
+          <a:chExt cx="0" cy="0"/>
+        </a:xfrm>
+      </p:grpSpPr>
+      <p:sp>
+        <p:nvSpPr>
+          <p:cNvPr id="2" name="Title 1"/>
+          <p:cNvSpPr>
+            <a:spLocks noGrp="1"/>
+          </p:cNvSpPr>
+          <p:nvPr>
+            <p:ph type="title"/>
+          </p:nvPr>
+        </p:nvSpPr>
+        <p:spPr/>
+        <p:txBody>
+          <a:bodyPr/>
+          <a:lstStyle/>
+          <a:p>
+            <a:r>
+              <a:rPr lang="en-US" altLang="ko-KR" dirty="0"/>
+              <a:t>6.2 </a:t>
+            </a:r>
+            <a:r>
+              <a:rPr lang="ko-KR" altLang="en-US" dirty="0"/>
+              <a:t>가중치의 초깃값</a:t>
+            </a:r>
+          </a:p>
+        </p:txBody>
+      </p:sp>
+      <p:sp>
+        <p:nvSpPr>
+          <p:cNvPr id="3" name="Content Placeholder 2"/>
+          <p:cNvSpPr>
+            <a:spLocks noGrp="1"/>
+          </p:cNvSpPr>
+          <p:nvPr>
+            <p:ph idx="1"/>
+          </p:nvPr>
+        </p:nvSpPr>
+        <p:spPr/>
+        <p:txBody>
+          <a:bodyPr/>
+          <a:lstStyle/>
+          <a:p>
+            <a:r>
+              <a:rPr lang="en-US" altLang="ko-KR" dirty="0" smtClean="0"/>
+              <a:t>6.2.3 </a:t>
+            </a:r>
+            <a:r>
+              <a:rPr lang="en-US" altLang="ko-KR" dirty="0" err="1" smtClean="0"/>
+              <a:t>ReLU</a:t>
+            </a:r>
+            <a:r>
+              <a:rPr lang="ko-KR" altLang="en-US" dirty="0" smtClean="0"/>
+              <a:t>를 사용할 때의 가중치 초깃값</a:t>
+            </a:r>
+            <a:endParaRPr lang="en-US" altLang="ko-KR" dirty="0" smtClean="0"/>
+          </a:p>
+          <a:p>
+            <a:pPr lvl="1"/>
+            <a:r>
+              <a:rPr lang="en-US" altLang="ko-KR" dirty="0" smtClean="0"/>
+              <a:t>Xavier</a:t>
+            </a:r>
+            <a:r>
+              <a:rPr lang="ko-KR" altLang="en-US" dirty="0" smtClean="0"/>
+              <a:t>초깃값은 활성화 함수가 선형인 것을 전제로 이끈 결과</a:t>
+            </a:r>
+            <a:endParaRPr lang="en-US" altLang="ko-KR" dirty="0" smtClean="0"/>
+          </a:p>
+          <a:p>
+            <a:pPr lvl="1"/>
+            <a:r>
+              <a:rPr lang="ko-KR" altLang="en-US" dirty="0" smtClean="0"/>
+              <a:t>반면 </a:t>
+            </a:r>
+            <a:r>
+              <a:rPr lang="en-US" altLang="ko-KR" dirty="0" err="1" smtClean="0">
+                <a:solidFill>
+                  <a:srgbClr val="FF0000"/>
+                </a:solidFill>
+              </a:rPr>
+              <a:t>ReLU</a:t>
+            </a:r>
+            <a:r>
+              <a:rPr lang="ko-KR" altLang="en-US" dirty="0" smtClean="0">
+                <a:solidFill>
+                  <a:srgbClr val="FF0000"/>
+                </a:solidFill>
+              </a:rPr>
+              <a:t>를 이용할 때는 </a:t>
+            </a:r>
+            <a:r>
+              <a:rPr lang="en-US" altLang="ko-KR" dirty="0" err="1" smtClean="0">
+                <a:solidFill>
+                  <a:srgbClr val="FF0000"/>
+                </a:solidFill>
+              </a:rPr>
+              <a:t>ReLU</a:t>
+            </a:r>
+            <a:r>
+              <a:rPr lang="ko-KR" altLang="en-US" dirty="0" smtClean="0">
+                <a:solidFill>
+                  <a:srgbClr val="FF0000"/>
+                </a:solidFill>
+              </a:rPr>
+              <a:t>에 특화된 초깃값</a:t>
+            </a:r>
+            <a:r>
+              <a:rPr lang="ko-KR" altLang="en-US" dirty="0" smtClean="0"/>
+              <a:t>을 이용하라고 권장</a:t>
+            </a:r>
+            <a:endParaRPr lang="en-US" altLang="ko-KR" dirty="0" smtClean="0"/>
+          </a:p>
+          <a:p>
+            <a:pPr lvl="1"/>
+            <a:r>
+              <a:rPr lang="ko-KR" altLang="en-US" dirty="0" smtClean="0"/>
+              <a:t>이 특화된 초깃값을 찾아낸 카이밍 히</a:t>
+            </a:r>
+            <a:r>
+              <a:rPr lang="en-US" altLang="ko-KR" dirty="0" smtClean="0"/>
+              <a:t>(</a:t>
+            </a:r>
+            <a:r>
+              <a:rPr lang="en-US" altLang="ko-KR" dirty="0" err="1" smtClean="0"/>
+              <a:t>Kaiming</a:t>
+            </a:r>
+            <a:r>
+              <a:rPr lang="en-US" altLang="ko-KR" dirty="0" smtClean="0"/>
+              <a:t> He)</a:t>
+            </a:r>
+            <a:r>
+              <a:rPr lang="ko-KR" altLang="en-US" dirty="0" smtClean="0"/>
+              <a:t>의 이름을 따 </a:t>
+            </a:r>
+            <a:r>
+              <a:rPr lang="en-US" altLang="ko-KR" dirty="0" smtClean="0"/>
+              <a:t>He </a:t>
+            </a:r>
+            <a:r>
+              <a:rPr lang="ko-KR" altLang="en-US" dirty="0" smtClean="0"/>
+              <a:t>초깃값이라고 한다</a:t>
+            </a:r>
+            <a:r>
+              <a:rPr lang="en-US" altLang="ko-KR" dirty="0" smtClean="0"/>
+              <a:t>. </a:t>
+            </a:r>
+            <a:r>
+              <a:rPr lang="ko-KR" altLang="en-US" dirty="0" smtClean="0"/>
+              <a:t>표준편차는 </a:t>
+            </a:r>
+            <a:endParaRPr lang="en-US" altLang="ko-KR" dirty="0" smtClean="0"/>
+          </a:p>
+        </p:txBody>
+      </p:sp>
+      <p:pic>
+        <p:nvPicPr>
+          <p:cNvPr id="4" name="Picture 3"/>
+          <p:cNvPicPr>
+            <a:picLocks noChangeAspect="1"/>
+          </p:cNvPicPr>
+          <p:nvPr/>
+        </p:nvPicPr>
+        <p:blipFill>
+          <a:blip r:embed="rId2">
+            <a:extLst>
+              <a:ext uri="{28A0092B-C50C-407E-A947-70E740481C1C}">
+                <a14:useLocalDpi xmlns:a14="http://schemas.microsoft.com/office/drawing/2010/main" val="0"/>
+              </a:ext>
+            </a:extLst>
+          </a:blip>
+          <a:stretch>
+            <a:fillRect/>
+          </a:stretch>
+        </p:blipFill>
+        <p:spPr>
+          <a:xfrm>
             <a:off x="5679307" y="3482108"/>
             <a:ext cx="1395747" cy="1432803"/>
           </a:xfrm>
@@ -9939,10 +11323,17 @@
   <p:clrMapOvr>
     <a:masterClrMapping/>
   </p:clrMapOvr>
+  <p:timing>
+    <p:tnLst>
+      <p:par>
+        <p:cTn id="1" dur="indefinite" restart="never" nodeType="tmRoot"/>
+      </p:par>
+    </p:tnLst>
+  </p:timing>
 </p:sld>
 </file>
 
-<file path=ppt/slides/slide28.xml><?xml version="1.0" encoding="utf-8"?>
+<file path=ppt/slides/slide33.xml><?xml version="1.0" encoding="utf-8"?>
 <p:sld xmlns:a="http://schemas.openxmlformats.org/drawingml/2006/main" xmlns:r="http://schemas.openxmlformats.org/officeDocument/2006/relationships" xmlns:p="http://schemas.openxmlformats.org/presentationml/2006/main">
   <p:cSld>
     <p:spTree>
@@ -10153,7 +11544,7 @@
 </p:sld>
 </file>
 
-<file path=ppt/slides/slide29.xml><?xml version="1.0" encoding="utf-8"?>
+<file path=ppt/slides/slide34.xml><?xml version="1.0" encoding="utf-8"?>
 <p:sld xmlns:a="http://schemas.openxmlformats.org/drawingml/2006/main" xmlns:r="http://schemas.openxmlformats.org/officeDocument/2006/relationships" xmlns:p="http://schemas.openxmlformats.org/presentationml/2006/main">
   <p:cSld>
     <p:spTree>
@@ -10278,153 +11669,7 @@
 </p:sld>
 </file>
 
-<file path=ppt/slides/slide3.xml><?xml version="1.0" encoding="utf-8"?>
-<p:sld xmlns:a="http://schemas.openxmlformats.org/drawingml/2006/main" xmlns:r="http://schemas.openxmlformats.org/officeDocument/2006/relationships" xmlns:p="http://schemas.openxmlformats.org/presentationml/2006/main">
-  <p:cSld>
-    <p:spTree>
-      <p:nvGrpSpPr>
-        <p:cNvPr id="1" name=""/>
-        <p:cNvGrpSpPr/>
-        <p:nvPr/>
-      </p:nvGrpSpPr>
-      <p:grpSpPr>
-        <a:xfrm>
-          <a:off x="0" y="0"/>
-          <a:ext cx="0" cy="0"/>
-          <a:chOff x="0" y="0"/>
-          <a:chExt cx="0" cy="0"/>
-        </a:xfrm>
-      </p:grpSpPr>
-      <p:sp>
-        <p:nvSpPr>
-          <p:cNvPr id="2" name="Title 1"/>
-          <p:cNvSpPr>
-            <a:spLocks noGrp="1"/>
-          </p:cNvSpPr>
-          <p:nvPr>
-            <p:ph type="title"/>
-          </p:nvPr>
-        </p:nvSpPr>
-        <p:spPr/>
-        <p:txBody>
-          <a:bodyPr/>
-          <a:lstStyle/>
-          <a:p>
-            <a:r>
-              <a:rPr lang="en-US" altLang="ko-KR" dirty="0" smtClean="0"/>
-              <a:t>6.1 </a:t>
-            </a:r>
-            <a:r>
-              <a:rPr lang="ko-KR" altLang="en-US" dirty="0" smtClean="0"/>
-              <a:t>매개변수 갱신</a:t>
-            </a:r>
-            <a:endParaRPr lang="ko-KR" altLang="en-US" dirty="0"/>
-          </a:p>
-        </p:txBody>
-      </p:sp>
-      <p:sp>
-        <p:nvSpPr>
-          <p:cNvPr id="3" name="Content Placeholder 2"/>
-          <p:cNvSpPr>
-            <a:spLocks noGrp="1"/>
-          </p:cNvSpPr>
-          <p:nvPr>
-            <p:ph idx="1"/>
-          </p:nvPr>
-        </p:nvSpPr>
-        <p:spPr/>
-        <p:txBody>
-          <a:bodyPr/>
-          <a:lstStyle/>
-          <a:p>
-            <a:r>
-              <a:rPr lang="ko-KR" altLang="en-US" dirty="0" smtClean="0"/>
-              <a:t>신경망 학습의 목적</a:t>
-            </a:r>
-            <a:r>
-              <a:rPr lang="en-US" altLang="ko-KR" dirty="0" smtClean="0"/>
-              <a:t>? </a:t>
-            </a:r>
-            <a:r>
-              <a:rPr lang="ko-KR" altLang="en-US" dirty="0" smtClean="0"/>
-              <a:t>손실함수의 값을 낮추는 매개변수 찾는 것</a:t>
-            </a:r>
-            <a:endParaRPr lang="en-US" altLang="ko-KR" dirty="0" smtClean="0"/>
-          </a:p>
-          <a:p>
-            <a:r>
-              <a:rPr lang="ko-KR" altLang="en-US" dirty="0" smtClean="0"/>
-              <a:t>즉 매개변수의 최적값을 찾는 문제</a:t>
-            </a:r>
-            <a:endParaRPr lang="en-US" altLang="ko-KR" dirty="0" smtClean="0"/>
-          </a:p>
-          <a:p>
-            <a:r>
-              <a:rPr lang="ko-KR" altLang="en-US" dirty="0" smtClean="0"/>
-              <a:t>이러한 문제를 푸는 것을 최적화</a:t>
-            </a:r>
-            <a:r>
-              <a:rPr lang="en-US" altLang="ko-KR" dirty="0" smtClean="0"/>
-              <a:t>(optimization)</a:t>
-            </a:r>
-            <a:r>
-              <a:rPr lang="ko-KR" altLang="en-US" dirty="0" smtClean="0"/>
-              <a:t>라고 합니다</a:t>
-            </a:r>
-            <a:r>
-              <a:rPr lang="en-US" altLang="ko-KR" dirty="0" smtClean="0"/>
-              <a:t>.</a:t>
-            </a:r>
-          </a:p>
-          <a:p>
-            <a:endParaRPr lang="en-US" altLang="ko-KR" dirty="0"/>
-          </a:p>
-          <a:p>
-            <a:r>
-              <a:rPr lang="ko-KR" altLang="en-US" dirty="0" smtClean="0"/>
-              <a:t>신경망의 최적화는 굉장히 어려운 문제</a:t>
-            </a:r>
-            <a:endParaRPr lang="en-US" altLang="ko-KR" dirty="0" smtClean="0"/>
-          </a:p>
-          <a:p>
-            <a:pPr lvl="1"/>
-            <a:r>
-              <a:rPr lang="ko-KR" altLang="en-US" dirty="0" smtClean="0"/>
-              <a:t>매개변수 공간은 매우 넓고 복잡</a:t>
-            </a:r>
-            <a:endParaRPr lang="en-US" altLang="ko-KR" dirty="0" smtClean="0"/>
-          </a:p>
-          <a:p>
-            <a:pPr lvl="1"/>
-            <a:r>
-              <a:rPr lang="ko-KR" altLang="en-US" dirty="0" smtClean="0"/>
-              <a:t>매개변수의 수가 엄청나게 많음</a:t>
-            </a:r>
-            <a:endParaRPr lang="ko-KR" altLang="en-US" dirty="0"/>
-          </a:p>
-        </p:txBody>
-      </p:sp>
-    </p:spTree>
-    <p:extLst>
-      <p:ext uri="{BB962C8B-B14F-4D97-AF65-F5344CB8AC3E}">
-        <p14:creationId xmlns:p14="http://schemas.microsoft.com/office/powerpoint/2010/main" val="2509572580"/>
-      </p:ext>
-    </p:extLst>
-  </p:cSld>
-  <p:clrMapOvr>
-    <a:masterClrMapping/>
-  </p:clrMapOvr>
-  <p:timing>
-    <p:tnLst>
-      <p:par>
-        <p:cTn id="1" dur="indefinite" restart="never" nodeType="tmRoot"/>
-      </p:par>
-    </p:tnLst>
-  </p:timing>
-</p:sld>
-</file>
-
-<file path=ppt/slides/slide30.xml><?xml version="1.0" encoding="utf-8"?>
+<file path=ppt/slides/slide35.xml><?xml version="1.0" encoding="utf-8"?>
 <p:sld xmlns:a="http://schemas.openxmlformats.org/drawingml/2006/main" xmlns:r="http://schemas.openxmlformats.org/officeDocument/2006/relationships" xmlns:p="http://schemas.openxmlformats.org/presentationml/2006/main">
   <p:cSld>
     <p:spTree>
@@ -10636,8 +11881,24 @@
               <a:t>6.1 </a:t>
             </a:r>
             <a:r>
-              <a:rPr lang="ko-KR" altLang="en-US" dirty="0" smtClean="0"/>
-              <a:t>매개변수 갱신</a:t>
+              <a:rPr lang="en-US" altLang="ko-KR" dirty="0" smtClean="0"/>
+              <a:t>(Alex Net – 2012</a:t>
+            </a:r>
+            <a:r>
+              <a:rPr lang="ko-KR" altLang="en-US" dirty="0" smtClean="0"/>
+              <a:t>년 </a:t>
+            </a:r>
+            <a:r>
+              <a:rPr lang="en-US" altLang="ko-KR" dirty="0" smtClean="0"/>
+              <a:t>ILSVRC</a:t>
+            </a:r>
+            <a:r>
+              <a:rPr lang="ko-KR" altLang="en-US" dirty="0" smtClean="0"/>
+              <a:t>우승</a:t>
+            </a:r>
+            <a:r>
+              <a:rPr lang="en-US" altLang="ko-KR" dirty="0" smtClean="0"/>
+              <a:t>)</a:t>
             </a:r>
             <a:endParaRPr lang="ko-KR" altLang="en-US" dirty="0"/>
           </a:p>
@@ -10665,7 +11926,7 @@
         </p:blipFill>
         <p:spPr>
           <a:xfrm>
-            <a:off x="0" y="2120152"/>
+            <a:off x="0" y="1362778"/>
             <a:ext cx="12192000" cy="3910784"/>
           </a:xfrm>
           <a:prstGeom prst="rect">
@@ -10673,6 +11934,139 @@
           </a:prstGeom>
         </p:spPr>
       </p:pic>
+      <p:sp>
+        <p:nvSpPr>
+          <p:cNvPr id="3" name="TextBox 2"/>
+          <p:cNvSpPr txBox="1"/>
+          <p:nvPr/>
+        </p:nvSpPr>
+        <p:spPr>
+          <a:xfrm>
+            <a:off x="1246910" y="5338616"/>
+            <a:ext cx="9220345" cy="1477328"/>
+          </a:xfrm>
+          <a:prstGeom prst="rect">
+            <a:avLst/>
+          </a:prstGeom>
+          <a:noFill/>
+        </p:spPr>
+        <p:txBody>
+          <a:bodyPr wrap="none" rtlCol="0">
+            <a:spAutoFit/>
+          </a:bodyPr>
+          <a:lstStyle/>
+          <a:p>
+            <a:r>
+              <a:rPr lang="en-US" altLang="ko-KR" dirty="0" smtClean="0"/>
+              <a:t>5</a:t>
+            </a:r>
+            <a:r>
+              <a:rPr lang="ko-KR" altLang="en-US" dirty="0" smtClean="0"/>
+              <a:t>개의 </a:t>
+            </a:r>
+            <a:r>
+              <a:rPr lang="en-US" altLang="ko-KR" dirty="0" smtClean="0"/>
+              <a:t>convolution Layers</a:t>
+            </a:r>
+            <a:r>
+              <a:rPr lang="ko-KR" altLang="en-US" dirty="0" smtClean="0"/>
+              <a:t>와 </a:t>
+            </a:r>
+            <a:r>
+              <a:rPr lang="en-US" altLang="ko-KR" dirty="0" smtClean="0"/>
+              <a:t>3</a:t>
+            </a:r>
+            <a:r>
+              <a:rPr lang="ko-KR" altLang="en-US" dirty="0" smtClean="0"/>
+              <a:t>개의 </a:t>
+            </a:r>
+            <a:r>
+              <a:rPr lang="en-US" altLang="ko-KR" dirty="0" smtClean="0"/>
+              <a:t>full-connected Layers</a:t>
+            </a:r>
+          </a:p>
+          <a:p>
+            <a:endParaRPr lang="en-US" altLang="ko-KR" dirty="0"/>
+          </a:p>
+          <a:p>
+            <a:r>
+              <a:rPr lang="ko-KR" altLang="en-US" dirty="0" smtClean="0"/>
+              <a:t>약 </a:t>
+            </a:r>
+            <a:r>
+              <a:rPr lang="en-US" altLang="ko-KR" dirty="0" smtClean="0"/>
+              <a:t>65</a:t>
+            </a:r>
+            <a:r>
+              <a:rPr lang="ko-KR" altLang="en-US" dirty="0" smtClean="0"/>
+              <a:t>만개의 뉴런</a:t>
+            </a:r>
+            <a:r>
+              <a:rPr lang="en-US" altLang="ko-KR" dirty="0" smtClean="0"/>
+              <a:t>, 6000</a:t>
+            </a:r>
+            <a:r>
+              <a:rPr lang="ko-KR" altLang="en-US" dirty="0" smtClean="0"/>
+              <a:t>만개의 </a:t>
+            </a:r>
+            <a:r>
+              <a:rPr lang="en-US" altLang="ko-KR" dirty="0" smtClean="0"/>
+              <a:t>free parameter </a:t>
+            </a:r>
+            <a:r>
+              <a:rPr lang="ko-KR" altLang="en-US" dirty="0" smtClean="0"/>
+              <a:t>및 </a:t>
+            </a:r>
+            <a:r>
+              <a:rPr lang="en-US" altLang="ko-KR" dirty="0" smtClean="0"/>
+              <a:t>6</a:t>
+            </a:r>
+            <a:r>
+              <a:rPr lang="ko-KR" altLang="en-US" dirty="0" smtClean="0"/>
+              <a:t>억 </a:t>
+            </a:r>
+            <a:r>
+              <a:rPr lang="en-US" altLang="ko-KR" dirty="0" smtClean="0"/>
+              <a:t>3000</a:t>
+            </a:r>
+            <a:r>
+              <a:rPr lang="ko-KR" altLang="en-US" dirty="0" smtClean="0"/>
+              <a:t>만개의 </a:t>
+            </a:r>
+            <a:r>
+              <a:rPr lang="en-US" altLang="ko-KR" dirty="0" smtClean="0"/>
+              <a:t>connection</a:t>
+            </a:r>
+            <a:r>
+              <a:rPr lang="ko-KR" altLang="en-US" dirty="0" smtClean="0"/>
+              <a:t>으로 구성</a:t>
+            </a:r>
+            <a:endParaRPr lang="en-US" altLang="ko-KR" dirty="0" smtClean="0"/>
+          </a:p>
+          <a:p>
+            <a:endParaRPr lang="en-US" altLang="ko-KR" dirty="0"/>
+          </a:p>
+          <a:p>
+            <a:r>
+              <a:rPr lang="en-US" altLang="ko-KR" dirty="0" smtClean="0"/>
+              <a:t>2</a:t>
+            </a:r>
+            <a:r>
+              <a:rPr lang="ko-KR" altLang="en-US" dirty="0" smtClean="0"/>
+              <a:t>개의 </a:t>
+            </a:r>
+            <a:r>
+              <a:rPr lang="en-US" altLang="ko-KR" dirty="0" smtClean="0"/>
+              <a:t>GPU</a:t>
+            </a:r>
+            <a:r>
+              <a:rPr lang="ko-KR" altLang="en-US" dirty="0" smtClean="0"/>
+              <a:t>를 사용하여 계산</a:t>
+            </a:r>
+            <a:endParaRPr lang="ko-KR" altLang="en-US" dirty="0"/>
+          </a:p>
+        </p:txBody>
+      </p:sp>
     </p:spTree>
     <p:extLst>
       <p:ext uri="{BB962C8B-B14F-4D97-AF65-F5344CB8AC3E}">
@@ -10730,8 +12124,24 @@
               <a:t>6.1 </a:t>
             </a:r>
             <a:r>
-              <a:rPr lang="ko-KR" altLang="en-US" dirty="0" smtClean="0"/>
-              <a:t>매개변수 갱신</a:t>
+              <a:rPr lang="en-US" altLang="ko-KR" dirty="0" smtClean="0"/>
+              <a:t>(Google Net – 2014</a:t>
+            </a:r>
+            <a:r>
+              <a:rPr lang="ko-KR" altLang="en-US" dirty="0" smtClean="0"/>
+              <a:t>년 </a:t>
+            </a:r>
+            <a:r>
+              <a:rPr lang="en-US" altLang="ko-KR" dirty="0" smtClean="0"/>
+              <a:t>ILSVRC</a:t>
+            </a:r>
+            <a:r>
+              <a:rPr lang="ko-KR" altLang="en-US" dirty="0" smtClean="0"/>
+              <a:t>우승</a:t>
+            </a:r>
+            <a:r>
+              <a:rPr lang="en-US" altLang="ko-KR" dirty="0" smtClean="0"/>
+              <a:t>)</a:t>
             </a:r>
             <a:endParaRPr lang="ko-KR" altLang="en-US" dirty="0"/>
           </a:p>
@@ -10759,7 +12169,7 @@
         </p:blipFill>
         <p:spPr>
           <a:xfrm>
-            <a:off x="0" y="2062817"/>
+            <a:off x="0" y="1527110"/>
             <a:ext cx="12192000" cy="2732365"/>
           </a:xfrm>
           <a:prstGeom prst="rect">
@@ -10767,6 +12177,130 @@
           </a:prstGeom>
         </p:spPr>
       </p:pic>
+      <p:sp>
+        <p:nvSpPr>
+          <p:cNvPr id="3" name="TextBox 2"/>
+          <p:cNvSpPr txBox="1"/>
+          <p:nvPr/>
+        </p:nvSpPr>
+        <p:spPr>
+          <a:xfrm>
+            <a:off x="2595418" y="4867564"/>
+            <a:ext cx="6700680" cy="1477328"/>
+          </a:xfrm>
+          <a:prstGeom prst="rect">
+            <a:avLst/>
+          </a:prstGeom>
+          <a:noFill/>
+        </p:spPr>
+        <p:txBody>
+          <a:bodyPr wrap="none" rtlCol="0">
+            <a:spAutoFit/>
+          </a:bodyPr>
+          <a:lstStyle/>
+          <a:p>
+            <a:r>
+              <a:rPr lang="en-US" altLang="ko-KR" dirty="0" smtClean="0"/>
+              <a:t>2014</a:t>
+            </a:r>
+            <a:r>
+              <a:rPr lang="ko-KR" altLang="en-US" dirty="0" smtClean="0"/>
+              <a:t>년부터 </a:t>
+            </a:r>
+            <a:r>
+              <a:rPr lang="en-US" altLang="ko-KR" dirty="0" smtClean="0"/>
+              <a:t>CNN</a:t>
+            </a:r>
+            <a:r>
+              <a:rPr lang="ko-KR" altLang="en-US" dirty="0" smtClean="0"/>
+              <a:t>의 구조에 변화가 나타나기 시작</a:t>
+            </a:r>
+            <a:r>
+              <a:rPr lang="en-US" altLang="ko-KR" dirty="0" smtClean="0"/>
+              <a:t>. </a:t>
+            </a:r>
+            <a:r>
+              <a:rPr lang="en-US" altLang="ko-KR" dirty="0" smtClean="0">
+                <a:solidFill>
+                  <a:srgbClr val="FF0000"/>
+                </a:solidFill>
+              </a:rPr>
+              <a:t>Deeper~</a:t>
+            </a:r>
+          </a:p>
+          <a:p>
+            <a:endParaRPr lang="en-US" altLang="ko-KR" dirty="0" smtClean="0">
+              <a:solidFill>
+                <a:srgbClr val="FF0000"/>
+              </a:solidFill>
+            </a:endParaRPr>
+          </a:p>
+          <a:p>
+            <a:r>
+              <a:rPr lang="en-US" altLang="ko-KR" dirty="0" smtClean="0"/>
+              <a:t>2013</a:t>
+            </a:r>
+            <a:r>
+              <a:rPr lang="ko-KR" altLang="en-US" dirty="0" smtClean="0"/>
+              <a:t>년까지는 </a:t>
+            </a:r>
+            <a:r>
+              <a:rPr lang="en-US" altLang="ko-KR" dirty="0" smtClean="0"/>
+              <a:t>10layer</a:t>
+            </a:r>
+            <a:r>
+              <a:rPr lang="ko-KR" altLang="en-US" dirty="0" smtClean="0"/>
+              <a:t>미만이였지만 </a:t>
+            </a:r>
+            <a:r>
+              <a:rPr lang="en-US" altLang="ko-KR" dirty="0" err="1" smtClean="0"/>
+              <a:t>GoogleNet</a:t>
+            </a:r>
+            <a:r>
+              <a:rPr lang="ko-KR" altLang="en-US" dirty="0" smtClean="0"/>
+              <a:t>은 </a:t>
+            </a:r>
+            <a:r>
+              <a:rPr lang="en-US" altLang="ko-KR" dirty="0" smtClean="0"/>
+              <a:t>22 layer</a:t>
+            </a:r>
+          </a:p>
+          <a:p>
+            <a:endParaRPr lang="en-US" altLang="ko-KR" dirty="0" smtClean="0"/>
+          </a:p>
+          <a:p>
+            <a:r>
+              <a:rPr lang="en-US" altLang="ko-KR" dirty="0" smtClean="0"/>
+              <a:t>2015</a:t>
+            </a:r>
+            <a:r>
+              <a:rPr lang="ko-KR" altLang="en-US" dirty="0" smtClean="0"/>
+              <a:t>년 우승한 </a:t>
+            </a:r>
+            <a:r>
+              <a:rPr lang="en-US" altLang="ko-KR" dirty="0" err="1" smtClean="0"/>
+              <a:t>ResNet</a:t>
+            </a:r>
+            <a:r>
+              <a:rPr lang="ko-KR" altLang="en-US" dirty="0" smtClean="0"/>
+              <a:t>은 망의 깊이가 </a:t>
+            </a:r>
+            <a:r>
+              <a:rPr lang="en-US" altLang="ko-KR" dirty="0" smtClean="0"/>
+              <a:t>152 layer</a:t>
+            </a:r>
+            <a:r>
+              <a:rPr lang="ko-KR" altLang="en-US" dirty="0" smtClean="0"/>
+              <a:t>로 더 깊어진다</a:t>
+            </a:r>
+            <a:r>
+              <a:rPr lang="en-US" altLang="ko-KR" dirty="0" smtClean="0"/>
+              <a:t>.</a:t>
+            </a:r>
+            <a:endParaRPr lang="ko-KR" altLang="en-US" dirty="0"/>
+          </a:p>
+        </p:txBody>
+      </p:sp>
     </p:spTree>
     <p:extLst>
       <p:ext uri="{BB962C8B-B14F-4D97-AF65-F5344CB8AC3E}">
@@ -10820,73 +12354,116 @@
           <a:lstStyle/>
           <a:p>
             <a:r>
-              <a:rPr lang="en-US" altLang="ko-KR" dirty="0" smtClean="0"/>
+              <a:rPr lang="en-US" altLang="ko-KR" dirty="0"/>
               <a:t>6.1 </a:t>
             </a:r>
             <a:r>
-              <a:rPr lang="ko-KR" altLang="en-US" dirty="0" smtClean="0"/>
-              <a:t>매개변수 갱신</a:t>
+              <a:rPr lang="en-US" altLang="ko-KR" dirty="0" smtClean="0"/>
+              <a:t>(</a:t>
+            </a:r>
+            <a:r>
+              <a:rPr lang="en-US" altLang="ko-KR" dirty="0" err="1" smtClean="0"/>
+              <a:t>ResNet</a:t>
+            </a:r>
+            <a:r>
+              <a:rPr lang="en-US" altLang="ko-KR" dirty="0" smtClean="0"/>
+              <a:t> </a:t>
+            </a:r>
+            <a:r>
+              <a:rPr lang="en-US" altLang="ko-KR" dirty="0"/>
+              <a:t>– </a:t>
+            </a:r>
+            <a:r>
+              <a:rPr lang="en-US" altLang="ko-KR" dirty="0" smtClean="0"/>
+              <a:t>2015</a:t>
+            </a:r>
+            <a:r>
+              <a:rPr lang="ko-KR" altLang="en-US" dirty="0" smtClean="0"/>
+              <a:t>년 </a:t>
+            </a:r>
+            <a:r>
+              <a:rPr lang="en-US" altLang="ko-KR" dirty="0"/>
+              <a:t>ILSVRC</a:t>
+            </a:r>
+            <a:r>
+              <a:rPr lang="ko-KR" altLang="en-US" dirty="0"/>
+              <a:t>우승</a:t>
+            </a:r>
+            <a:r>
+              <a:rPr lang="en-US" altLang="ko-KR" dirty="0"/>
+              <a:t>)</a:t>
             </a:r>
             <a:endParaRPr lang="ko-KR" altLang="en-US" dirty="0"/>
           </a:p>
         </p:txBody>
       </p:sp>
-      <p:sp>
-        <p:nvSpPr>
-          <p:cNvPr id="3" name="Content Placeholder 2"/>
-          <p:cNvSpPr>
-            <a:spLocks noGrp="1"/>
-          </p:cNvSpPr>
-          <p:nvPr>
-            <p:ph idx="1"/>
-          </p:nvPr>
-        </p:nvSpPr>
-        <p:spPr/>
-        <p:txBody>
-          <a:bodyPr/>
-          <a:lstStyle/>
-          <a:p>
-            <a:r>
-              <a:rPr lang="ko-KR" altLang="en-US" dirty="0" smtClean="0"/>
-              <a:t>우리는 지금까지 최적의 매개변수 값을 찾는 단서로 매개변수의 기울기</a:t>
-            </a:r>
-            <a:r>
-              <a:rPr lang="en-US" altLang="ko-KR" dirty="0" smtClean="0"/>
-              <a:t>(</a:t>
-            </a:r>
-            <a:r>
-              <a:rPr lang="ko-KR" altLang="en-US" dirty="0" smtClean="0"/>
-              <a:t>미분</a:t>
-            </a:r>
-            <a:r>
-              <a:rPr lang="en-US" altLang="ko-KR" dirty="0" smtClean="0"/>
-              <a:t>)</a:t>
-            </a:r>
-            <a:r>
-              <a:rPr lang="ko-KR" altLang="en-US" dirty="0" smtClean="0"/>
-              <a:t>을 이용</a:t>
-            </a:r>
-            <a:endParaRPr lang="en-US" altLang="ko-KR" dirty="0" smtClean="0"/>
-          </a:p>
-          <a:p>
-            <a:r>
-              <a:rPr lang="ko-KR" altLang="en-US" dirty="0" smtClean="0"/>
-              <a:t>기울기를 구해 기울어진 방향으로 매개변수 값을 갱신하는 일을 반복하여 최적의 값에 접근</a:t>
-            </a:r>
-            <a:endParaRPr lang="en-US" altLang="ko-KR" dirty="0" smtClean="0"/>
-          </a:p>
-          <a:p>
-            <a:r>
-              <a:rPr lang="ko-KR" altLang="en-US" dirty="0" smtClean="0"/>
-              <a:t>확률적 경사 하강법</a:t>
-            </a:r>
-            <a:r>
-              <a:rPr lang="en-US" altLang="ko-KR" dirty="0" smtClean="0"/>
-              <a:t>(SGD) – </a:t>
-            </a:r>
-            <a:r>
-              <a:rPr lang="zh-CN" altLang="en-US" dirty="0" smtClean="0"/>
-              <a:t>梯度下降法</a:t>
+      <p:pic>
+        <p:nvPicPr>
+          <p:cNvPr id="4" name="Picture 3"/>
+          <p:cNvPicPr>
+            <a:picLocks noChangeAspect="1"/>
+          </p:cNvPicPr>
+          <p:nvPr/>
+        </p:nvPicPr>
+        <p:blipFill>
+          <a:blip r:embed="rId2">
+            <a:extLst>
+              <a:ext uri="{28A0092B-C50C-407E-A947-70E740481C1C}">
+                <a14:useLocalDpi xmlns:a14="http://schemas.microsoft.com/office/drawing/2010/main" val="0"/>
+              </a:ext>
+            </a:extLst>
+          </a:blip>
+          <a:stretch>
+            <a:fillRect/>
+          </a:stretch>
+        </p:blipFill>
+        <p:spPr>
+          <a:xfrm>
+            <a:off x="1333500" y="1509712"/>
+            <a:ext cx="9525000" cy="3838575"/>
+          </a:xfrm>
+          <a:prstGeom prst="rect">
+            <a:avLst/>
+          </a:prstGeom>
+        </p:spPr>
+      </p:pic>
+      <p:sp>
+        <p:nvSpPr>
+          <p:cNvPr id="5" name="TextBox 4"/>
+          <p:cNvSpPr txBox="1"/>
+          <p:nvPr/>
+        </p:nvSpPr>
+        <p:spPr>
+          <a:xfrm>
+            <a:off x="4239490" y="5717309"/>
+            <a:ext cx="3180679" cy="369332"/>
+          </a:xfrm>
+          <a:prstGeom prst="rect">
+            <a:avLst/>
+          </a:prstGeom>
+          <a:noFill/>
+        </p:spPr>
+        <p:txBody>
+          <a:bodyPr wrap="none" rtlCol="0">
+            <a:spAutoFit/>
+          </a:bodyPr>
+          <a:lstStyle/>
+          <a:p>
+            <a:r>
+              <a:rPr lang="ko-KR" altLang="en-US" dirty="0" smtClean="0"/>
+              <a:t>설계자 </a:t>
+            </a:r>
+            <a:r>
+              <a:rPr lang="en-US" altLang="ko-KR" dirty="0" err="1" smtClean="0"/>
+              <a:t>Kaiming</a:t>
+            </a:r>
+            <a:r>
+              <a:rPr lang="en-US" altLang="ko-KR" dirty="0" smtClean="0"/>
+              <a:t> He</a:t>
+            </a:r>
+            <a:r>
+              <a:rPr lang="ko-KR" altLang="en-US" dirty="0" smtClean="0"/>
+              <a:t>와 친구들</a:t>
             </a:r>
             <a:endParaRPr lang="ko-KR" altLang="en-US" dirty="0"/>
           </a:p>
@@ -10895,20 +12472,13 @@
     </p:spTree>
     <p:extLst>
       <p:ext uri="{BB962C8B-B14F-4D97-AF65-F5344CB8AC3E}">
-        <p14:creationId xmlns:p14="http://schemas.microsoft.com/office/powerpoint/2010/main" val="4002403095"/>
+        <p14:creationId xmlns:p14="http://schemas.microsoft.com/office/powerpoint/2010/main" val="4145440724"/>
       </p:ext>
     </p:extLst>
   </p:cSld>
   <p:clrMapOvr>
     <a:masterClrMapping/>
   </p:clrMapOvr>
-  <p:timing>
-    <p:tnLst>
-      <p:par>
-        <p:cTn id="1" dur="indefinite" restart="never" nodeType="tmRoot"/>
-      </p:par>
-    </p:tnLst>
-  </p:timing>
 </p:sld>
 </file>
 
@@ -10945,12 +12515,20 @@
           <a:lstStyle/>
           <a:p>
             <a:r>
-              <a:rPr lang="en-US" altLang="ko-KR" dirty="0" smtClean="0"/>
-              <a:t>6.1 </a:t>
-            </a:r>
-            <a:r>
-              <a:rPr lang="ko-KR" altLang="en-US" dirty="0" smtClean="0"/>
-              <a:t>매개변수 갱신</a:t>
+              <a:rPr lang="en-US" altLang="ko-KR" dirty="0" err="1" smtClean="0"/>
+              <a:t>Kaiming</a:t>
+            </a:r>
+            <a:r>
+              <a:rPr lang="en-US" altLang="ko-KR" dirty="0" smtClean="0"/>
+              <a:t> He(</a:t>
+            </a:r>
+            <a:r>
+              <a:rPr lang="ko-KR" altLang="en-US" dirty="0"/>
+              <a:t>何恺明</a:t>
+            </a:r>
+            <a:r>
+              <a:rPr lang="en-US" altLang="ko-KR" dirty="0" smtClean="0"/>
+              <a:t>)</a:t>
             </a:r>
             <a:endParaRPr lang="ko-KR" altLang="en-US" dirty="0"/>
           </a:p>
@@ -10971,22 +12549,146 @@
           <a:bodyPr/>
           <a:lstStyle/>
           <a:p>
-            <a:r>
-              <a:rPr lang="en-US" altLang="ko-KR" dirty="0" smtClean="0"/>
-              <a:t>6.1.1 </a:t>
-            </a:r>
-            <a:r>
-              <a:rPr lang="ko-KR" altLang="en-US" dirty="0" smtClean="0"/>
-              <a:t>모험가 이야기</a:t>
-            </a:r>
-            <a:endParaRPr lang="ko-KR" altLang="en-US" dirty="0"/>
-          </a:p>
-        </p:txBody>
-      </p:sp>
+            <a:pPr marL="0" indent="0">
+              <a:buNone/>
+            </a:pPr>
+            <a:endParaRPr lang="en-US" altLang="zh-CN" dirty="0"/>
+          </a:p>
+          <a:p>
+            <a:pPr marL="0" indent="0">
+              <a:buNone/>
+            </a:pPr>
+            <a:endParaRPr lang="en-US" altLang="zh-CN" dirty="0"/>
+          </a:p>
+          <a:p>
+            <a:r>
+              <a:rPr lang="zh-CN" altLang="en-US" dirty="0" smtClean="0"/>
+              <a:t>本科</a:t>
+            </a:r>
+            <a:r>
+              <a:rPr lang="zh-CN" altLang="en-US" dirty="0"/>
+              <a:t>就读</a:t>
+            </a:r>
+            <a:r>
+              <a:rPr lang="zh-CN" altLang="en-US" dirty="0" smtClean="0"/>
+              <a:t>于</a:t>
+            </a:r>
+            <a:r>
+              <a:rPr lang="zh-CN" altLang="en-US" dirty="0" smtClean="0">
+                <a:solidFill>
+                  <a:srgbClr val="0070C0"/>
+                </a:solidFill>
+              </a:rPr>
+              <a:t>清华大学</a:t>
+            </a:r>
+            <a:r>
+              <a:rPr lang="zh-CN" altLang="en-US" dirty="0" smtClean="0"/>
+              <a:t>，博士毕业于</a:t>
+            </a:r>
+            <a:r>
+              <a:rPr lang="zh-CN" altLang="en-US" dirty="0" smtClean="0">
+                <a:solidFill>
+                  <a:srgbClr val="0070C0"/>
+                </a:solidFill>
+              </a:rPr>
+              <a:t>香港中文大学</a:t>
+            </a:r>
+            <a:r>
+              <a:rPr lang="zh-CN" altLang="en-US" dirty="0" smtClean="0"/>
+              <a:t>多媒体实验室</a:t>
+            </a:r>
+            <a:endParaRPr lang="en-US" altLang="zh-CN" dirty="0" smtClean="0"/>
+          </a:p>
+          <a:p>
+            <a:r>
+              <a:rPr lang="en-US" altLang="zh-CN" dirty="0" smtClean="0"/>
+              <a:t>2011</a:t>
+            </a:r>
+            <a:r>
+              <a:rPr lang="zh-CN" altLang="en-US" dirty="0" smtClean="0"/>
+              <a:t>年加入微软亚洲研究院工作，主要研究</a:t>
+            </a:r>
+            <a:r>
+              <a:rPr lang="zh-CN" altLang="en-US" dirty="0" smtClean="0">
+                <a:solidFill>
+                  <a:srgbClr val="0070C0"/>
+                </a:solidFill>
+              </a:rPr>
+              <a:t>计算机视觉</a:t>
+            </a:r>
+            <a:r>
+              <a:rPr lang="zh-CN" altLang="en-US" dirty="0" smtClean="0"/>
+              <a:t>和</a:t>
+            </a:r>
+            <a:r>
+              <a:rPr lang="zh-CN" altLang="en-US" dirty="0" smtClean="0">
+                <a:solidFill>
+                  <a:srgbClr val="0070C0"/>
+                </a:solidFill>
+              </a:rPr>
+              <a:t>深度学习</a:t>
+            </a:r>
+            <a:endParaRPr lang="en-US" altLang="zh-CN" dirty="0" smtClean="0">
+              <a:solidFill>
+                <a:srgbClr val="0070C0"/>
+              </a:solidFill>
+            </a:endParaRPr>
+          </a:p>
+          <a:p>
+            <a:r>
+              <a:rPr lang="en-US" altLang="zh-CN" dirty="0" smtClean="0"/>
+              <a:t>2016</a:t>
+            </a:r>
+            <a:r>
+              <a:rPr lang="zh-CN" altLang="en-US" dirty="0" smtClean="0"/>
+              <a:t>年加入</a:t>
+            </a:r>
+            <a:r>
+              <a:rPr lang="en-US" altLang="zh-CN" dirty="0" smtClean="0"/>
+              <a:t>Facebook AI Research(FAIR)</a:t>
+            </a:r>
+            <a:r>
+              <a:rPr lang="zh-CN" altLang="en-US" dirty="0" smtClean="0"/>
+              <a:t>担任研究科学家</a:t>
+            </a:r>
+            <a:endParaRPr lang="en-US" altLang="zh-CN" dirty="0" smtClean="0"/>
+          </a:p>
+        </p:txBody>
+      </p:sp>
+      <p:pic>
+        <p:nvPicPr>
+          <p:cNvPr id="4" name="Picture 3"/>
+          <p:cNvPicPr>
+            <a:picLocks noChangeAspect="1"/>
+          </p:cNvPicPr>
+          <p:nvPr/>
+        </p:nvPicPr>
+        <p:blipFill>
+          <a:blip r:embed="rId2" cstate="print">
+            <a:extLst>
+              <a:ext uri="{28A0092B-C50C-407E-A947-70E740481C1C}">
+                <a14:useLocalDpi xmlns:a14="http://schemas.microsoft.com/office/drawing/2010/main" val="0"/>
+              </a:ext>
+            </a:extLst>
+          </a:blip>
+          <a:stretch>
+            <a:fillRect/>
+          </a:stretch>
+        </p:blipFill>
+        <p:spPr>
+          <a:xfrm>
+            <a:off x="9467275" y="747425"/>
+            <a:ext cx="1886525" cy="1886525"/>
+          </a:xfrm>
+          <a:prstGeom prst="rect">
+            <a:avLst/>
+          </a:prstGeom>
+        </p:spPr>
+      </p:pic>
     </p:spTree>
     <p:extLst>
       <p:ext uri="{BB962C8B-B14F-4D97-AF65-F5344CB8AC3E}">
-        <p14:creationId xmlns:p14="http://schemas.microsoft.com/office/powerpoint/2010/main" val="3957789837"/>
+        <p14:creationId xmlns:p14="http://schemas.microsoft.com/office/powerpoint/2010/main" val="3440502925"/>
       </p:ext>
     </p:extLst>
   </p:cSld>
@@ -11050,102 +12752,102 @@
             <p:ph idx="1"/>
           </p:nvPr>
         </p:nvSpPr>
-        <p:spPr>
-          <a:xfrm>
-            <a:off x="838200" y="1825625"/>
-            <a:ext cx="10515600" cy="548120"/>
-          </a:xfrm>
-        </p:spPr>
+        <p:spPr/>
         <p:txBody>
           <a:bodyPr/>
           <a:lstStyle/>
           <a:p>
             <a:r>
-              <a:rPr lang="en-US" altLang="ko-KR" dirty="0" smtClean="0"/>
-              <a:t>6.1.2 </a:t>
-            </a:r>
+              <a:rPr lang="ko-KR" altLang="en-US" dirty="0" smtClean="0"/>
+              <a:t>우리는 지금까지 최적의 매개변수 값을 찾는 단서로 매개변수의 </a:t>
+            </a:r>
+            <a:r>
+              <a:rPr lang="ko-KR" altLang="en-US" dirty="0" smtClean="0">
+                <a:solidFill>
+                  <a:srgbClr val="FF0000"/>
+                </a:solidFill>
+              </a:rPr>
+              <a:t>기울기</a:t>
+            </a:r>
+            <a:r>
+              <a:rPr lang="en-US" altLang="ko-KR" dirty="0" smtClean="0">
+                <a:solidFill>
+                  <a:srgbClr val="FF0000"/>
+                </a:solidFill>
+              </a:rPr>
+              <a:t>(</a:t>
+            </a:r>
+            <a:r>
+              <a:rPr lang="ko-KR" altLang="en-US" dirty="0" smtClean="0">
+                <a:solidFill>
+                  <a:srgbClr val="FF0000"/>
+                </a:solidFill>
+              </a:rPr>
+              <a:t>미분</a:t>
+            </a:r>
+            <a:r>
+              <a:rPr lang="en-US" altLang="ko-KR" dirty="0" smtClean="0">
+                <a:solidFill>
+                  <a:srgbClr val="FF0000"/>
+                </a:solidFill>
+              </a:rPr>
+              <a:t>)</a:t>
+            </a:r>
+            <a:r>
+              <a:rPr lang="ko-KR" altLang="en-US" dirty="0" smtClean="0"/>
+              <a:t>을 이용</a:t>
+            </a:r>
+            <a:endParaRPr lang="en-US" altLang="ko-KR" dirty="0" smtClean="0"/>
+          </a:p>
+          <a:p>
+            <a:r>
+              <a:rPr lang="ko-KR" altLang="en-US" dirty="0" smtClean="0"/>
+              <a:t>기울기를 구해 기울어진 방향으로 매개변수 값을 갱신하는 일을 반복하여 최적의 값에 접근</a:t>
+            </a:r>
+            <a:endParaRPr lang="en-US" altLang="ko-KR" dirty="0" smtClean="0"/>
+          </a:p>
+          <a:p>
             <a:r>
               <a:rPr lang="ko-KR" altLang="en-US" dirty="0" smtClean="0"/>
               <a:t>확률적 경사 하강법</a:t>
             </a:r>
             <a:r>
               <a:rPr lang="en-US" altLang="ko-KR" dirty="0" smtClean="0"/>
-              <a:t>(SGD)</a:t>
-            </a:r>
-            <a:endParaRPr lang="ko-KR" altLang="en-US" dirty="0"/>
-          </a:p>
-        </p:txBody>
-      </p:sp>
-      <p:pic>
-        <p:nvPicPr>
-          <p:cNvPr id="4" name="Picture 3"/>
-          <p:cNvPicPr>
-            <a:picLocks noChangeAspect="1"/>
-          </p:cNvPicPr>
-          <p:nvPr/>
-        </p:nvPicPr>
-        <p:blipFill>
-          <a:blip r:embed="rId2">
-            <a:extLst>
-              <a:ext uri="{28A0092B-C50C-407E-A947-70E740481C1C}">
-                <a14:useLocalDpi xmlns:a14="http://schemas.microsoft.com/office/drawing/2010/main" val="0"/>
-              </a:ext>
-            </a:extLst>
-          </a:blip>
-          <a:stretch>
-            <a:fillRect/>
-          </a:stretch>
-        </p:blipFill>
-        <p:spPr>
-          <a:xfrm>
-            <a:off x="4652226" y="2438765"/>
-            <a:ext cx="2314898" cy="1038370"/>
-          </a:xfrm>
-          <a:prstGeom prst="rect">
-            <a:avLst/>
-          </a:prstGeom>
-        </p:spPr>
-      </p:pic>
-      <p:pic>
-        <p:nvPicPr>
-          <p:cNvPr id="5" name="Picture 4"/>
-          <p:cNvPicPr>
-            <a:picLocks noChangeAspect="1"/>
-          </p:cNvPicPr>
-          <p:nvPr/>
-        </p:nvPicPr>
-        <p:blipFill>
-          <a:blip r:embed="rId3">
-            <a:extLst>
-              <a:ext uri="{28A0092B-C50C-407E-A947-70E740481C1C}">
-                <a14:useLocalDpi xmlns:a14="http://schemas.microsoft.com/office/drawing/2010/main" val="0"/>
-              </a:ext>
-            </a:extLst>
-          </a:blip>
-          <a:stretch>
-            <a:fillRect/>
-          </a:stretch>
-        </p:blipFill>
-        <p:spPr>
-          <a:xfrm>
-            <a:off x="3415251" y="3743198"/>
-            <a:ext cx="4696480" cy="1810003"/>
-          </a:xfrm>
-          <a:prstGeom prst="rect">
-            <a:avLst/>
-          </a:prstGeom>
-        </p:spPr>
-      </p:pic>
+              <a:t>(SGD) – </a:t>
+            </a:r>
+            <a:r>
+              <a:rPr lang="zh-CN" altLang="en-US" dirty="0" smtClean="0">
+                <a:solidFill>
+                  <a:srgbClr val="FF0000"/>
+                </a:solidFill>
+              </a:rPr>
+              <a:t>梯度下降法</a:t>
+            </a:r>
+            <a:endParaRPr lang="ko-KR" altLang="en-US" dirty="0">
+              <a:solidFill>
+                <a:srgbClr val="FF0000"/>
+              </a:solidFill>
+            </a:endParaRPr>
+          </a:p>
+        </p:txBody>
+      </p:sp>
     </p:spTree>
     <p:extLst>
       <p:ext uri="{BB962C8B-B14F-4D97-AF65-F5344CB8AC3E}">
-        <p14:creationId xmlns:p14="http://schemas.microsoft.com/office/powerpoint/2010/main" val="104966716"/>
+        <p14:creationId xmlns:p14="http://schemas.microsoft.com/office/powerpoint/2010/main" val="4002403095"/>
       </p:ext>
     </p:extLst>
   </p:cSld>
   <p:clrMapOvr>
     <a:masterClrMapping/>
   </p:clrMapOvr>
+  <p:timing>
+    <p:tnLst>
+      <p:par>
+        <p:cTn id="1" dur="indefinite" restart="never" nodeType="tmRoot"/>
+      </p:par>
+    </p:tnLst>
+  </p:timing>
 </p:sld>
 </file>
 
@@ -11206,7 +12908,7 @@
         <p:spPr>
           <a:xfrm>
             <a:off x="838200" y="1825625"/>
-            <a:ext cx="10515600" cy="483466"/>
+            <a:ext cx="10515600" cy="548120"/>
           </a:xfrm>
         </p:spPr>
         <p:txBody>
@@ -11215,11 +12917,15 @@
           <a:p>
             <a:r>
               <a:rPr lang="en-US" altLang="ko-KR" dirty="0" smtClean="0"/>
-              <a:t>6.1.3 SGD</a:t>
-            </a:r>
-            <a:r>
-              <a:rPr lang="ko-KR" altLang="en-US" dirty="0" smtClean="0"/>
-              <a:t>의 단점</a:t>
+              <a:t>6.1.2 </a:t>
+            </a:r>
+            <a:r>
+              <a:rPr lang="ko-KR" altLang="en-US" dirty="0" smtClean="0"/>
+              <a:t>확률적 경사 하강법</a:t>
+            </a:r>
+            <a:r>
+              <a:rPr lang="en-US" altLang="ko-KR" dirty="0" smtClean="0"/>
+              <a:t>(SGD)</a:t>
             </a:r>
             <a:endParaRPr lang="ko-KR" altLang="en-US" dirty="0"/>
           </a:p>
@@ -11247,8 +12953,8 @@
         </p:blipFill>
         <p:spPr>
           <a:xfrm>
-            <a:off x="4843287" y="2440500"/>
-            <a:ext cx="2505425" cy="924054"/>
+            <a:off x="4652226" y="2438765"/>
+            <a:ext cx="2314898" cy="1038370"/>
           </a:xfrm>
           <a:prstGeom prst="rect">
             <a:avLst/>
@@ -11277,8 +12983,8 @@
         </p:blipFill>
         <p:spPr>
           <a:xfrm>
-            <a:off x="2509337" y="3463120"/>
-            <a:ext cx="7173326" cy="3219899"/>
+            <a:off x="3415251" y="3743198"/>
+            <a:ext cx="4696480" cy="1810003"/>
           </a:xfrm>
           <a:prstGeom prst="rect">
             <a:avLst/>
@@ -11288,13 +12994,20 @@
     </p:spTree>
     <p:extLst>
       <p:ext uri="{BB962C8B-B14F-4D97-AF65-F5344CB8AC3E}">
-        <p14:creationId xmlns:p14="http://schemas.microsoft.com/office/powerpoint/2010/main" val="1469368300"/>
+        <p14:creationId xmlns:p14="http://schemas.microsoft.com/office/powerpoint/2010/main" val="104966716"/>
       </p:ext>
     </p:extLst>
   </p:cSld>
   <p:clrMapOvr>
     <a:masterClrMapping/>
   </p:clrMapOvr>
+  <p:timing>
+    <p:tnLst>
+      <p:par>
+        <p:cTn id="1" dur="indefinite" restart="never" nodeType="tmRoot"/>
+      </p:par>
+    </p:tnLst>
+  </p:timing>
 </p:sld>
 </file>
 

</xml_diff>